<commit_message>
visual look, scrum daily
</commit_message>
<xml_diff>
--- a/Dokumentit/Visuaalinen suunnittelu.pptx
+++ b/Dokumentit/Visuaalinen suunnittelu.pptx
@@ -8,6 +8,7 @@
     <p:sldId id="256" r:id="rId2"/>
     <p:sldId id="257" r:id="rId3"/>
     <p:sldId id="258" r:id="rId4"/>
+    <p:sldId id="259" r:id="rId5"/>
   </p:sldIdLst>
   <p:sldSz cx="12192000" cy="6858000"/>
   <p:notesSz cx="6858000" cy="9144000"/>
@@ -106,6 +107,11 @@
       </a:defRPr>
     </a:lvl9pPr>
   </p:defaultTextStyle>
+  <p:extLst>
+    <p:ext uri="{EFAFB233-063F-42B5-8137-9DF3F51BA10A}">
+      <p15:sldGuideLst xmlns:p15="http://schemas.microsoft.com/office/powerpoint/2012/main"/>
+    </p:ext>
+  </p:extLst>
 </p:presentation>
 </file>
 
@@ -258,7 +264,7 @@
           <a:p>
             <a:fld id="{366FCF9C-BCB8-43F1-A384-FBD74F66BD68}" type="datetimeFigureOut">
               <a:rPr lang="en-GB" smtClean="0"/>
-              <a:t>24/02/2023</a:t>
+              <a:t>07/03/2023</a:t>
             </a:fld>
             <a:endParaRPr lang="en-GB"/>
           </a:p>
@@ -458,7 +464,7 @@
           <a:p>
             <a:fld id="{366FCF9C-BCB8-43F1-A384-FBD74F66BD68}" type="datetimeFigureOut">
               <a:rPr lang="en-GB" smtClean="0"/>
-              <a:t>24/02/2023</a:t>
+              <a:t>07/03/2023</a:t>
             </a:fld>
             <a:endParaRPr lang="en-GB"/>
           </a:p>
@@ -668,7 +674,7 @@
           <a:p>
             <a:fld id="{366FCF9C-BCB8-43F1-A384-FBD74F66BD68}" type="datetimeFigureOut">
               <a:rPr lang="en-GB" smtClean="0"/>
-              <a:t>24/02/2023</a:t>
+              <a:t>07/03/2023</a:t>
             </a:fld>
             <a:endParaRPr lang="en-GB"/>
           </a:p>
@@ -868,7 +874,7 @@
           <a:p>
             <a:fld id="{366FCF9C-BCB8-43F1-A384-FBD74F66BD68}" type="datetimeFigureOut">
               <a:rPr lang="en-GB" smtClean="0"/>
-              <a:t>24/02/2023</a:t>
+              <a:t>07/03/2023</a:t>
             </a:fld>
             <a:endParaRPr lang="en-GB"/>
           </a:p>
@@ -1144,7 +1150,7 @@
           <a:p>
             <a:fld id="{366FCF9C-BCB8-43F1-A384-FBD74F66BD68}" type="datetimeFigureOut">
               <a:rPr lang="en-GB" smtClean="0"/>
-              <a:t>24/02/2023</a:t>
+              <a:t>07/03/2023</a:t>
             </a:fld>
             <a:endParaRPr lang="en-GB"/>
           </a:p>
@@ -1412,7 +1418,7 @@
           <a:p>
             <a:fld id="{366FCF9C-BCB8-43F1-A384-FBD74F66BD68}" type="datetimeFigureOut">
               <a:rPr lang="en-GB" smtClean="0"/>
-              <a:t>24/02/2023</a:t>
+              <a:t>07/03/2023</a:t>
             </a:fld>
             <a:endParaRPr lang="en-GB"/>
           </a:p>
@@ -1827,7 +1833,7 @@
           <a:p>
             <a:fld id="{366FCF9C-BCB8-43F1-A384-FBD74F66BD68}" type="datetimeFigureOut">
               <a:rPr lang="en-GB" smtClean="0"/>
-              <a:t>24/02/2023</a:t>
+              <a:t>07/03/2023</a:t>
             </a:fld>
             <a:endParaRPr lang="en-GB"/>
           </a:p>
@@ -1969,7 +1975,7 @@
           <a:p>
             <a:fld id="{366FCF9C-BCB8-43F1-A384-FBD74F66BD68}" type="datetimeFigureOut">
               <a:rPr lang="en-GB" smtClean="0"/>
-              <a:t>24/02/2023</a:t>
+              <a:t>07/03/2023</a:t>
             </a:fld>
             <a:endParaRPr lang="en-GB"/>
           </a:p>
@@ -2082,7 +2088,7 @@
           <a:p>
             <a:fld id="{366FCF9C-BCB8-43F1-A384-FBD74F66BD68}" type="datetimeFigureOut">
               <a:rPr lang="en-GB" smtClean="0"/>
-              <a:t>24/02/2023</a:t>
+              <a:t>07/03/2023</a:t>
             </a:fld>
             <a:endParaRPr lang="en-GB"/>
           </a:p>
@@ -2395,7 +2401,7 @@
           <a:p>
             <a:fld id="{366FCF9C-BCB8-43F1-A384-FBD74F66BD68}" type="datetimeFigureOut">
               <a:rPr lang="en-GB" smtClean="0"/>
-              <a:t>24/02/2023</a:t>
+              <a:t>07/03/2023</a:t>
             </a:fld>
             <a:endParaRPr lang="en-GB"/>
           </a:p>
@@ -2684,7 +2690,7 @@
           <a:p>
             <a:fld id="{366FCF9C-BCB8-43F1-A384-FBD74F66BD68}" type="datetimeFigureOut">
               <a:rPr lang="en-GB" smtClean="0"/>
-              <a:t>24/02/2023</a:t>
+              <a:t>07/03/2023</a:t>
             </a:fld>
             <a:endParaRPr lang="en-GB"/>
           </a:p>
@@ -2927,7 +2933,7 @@
           <a:p>
             <a:fld id="{366FCF9C-BCB8-43F1-A384-FBD74F66BD68}" type="datetimeFigureOut">
               <a:rPr lang="en-GB" smtClean="0"/>
-              <a:t>24/02/2023</a:t>
+              <a:t>07/03/2023</a:t>
             </a:fld>
             <a:endParaRPr lang="en-GB"/>
           </a:p>
@@ -3391,12 +3397,20 @@
         </p:nvSpPr>
         <p:spPr/>
         <p:txBody>
-          <a:bodyPr/>
+          <a:bodyPr>
+            <a:normAutofit/>
+          </a:bodyPr>
           <a:lstStyle/>
           <a:p>
             <a:r>
               <a:rPr lang="fi-FI" dirty="0"/>
               <a:t>WPF Laskutus</a:t>
+            </a:r>
+          </a:p>
+          <a:p>
+            <a:r>
+              <a:rPr lang="fi-FI" dirty="0"/>
+              <a:t> </a:t>
             </a:r>
             <a:endParaRPr lang="en-GB" dirty="0"/>
           </a:p>
@@ -3446,16 +3460,15 @@
         </p:nvSpPr>
         <p:spPr>
           <a:xfrm>
-            <a:off x="2102701" y="2107479"/>
+            <a:off x="2102699" y="2134762"/>
             <a:ext cx="1911249" cy="581891"/>
           </a:xfrm>
           <a:prstGeom prst="roundRect">
             <a:avLst/>
           </a:prstGeom>
           <a:solidFill>
-            <a:schemeClr val="accent1">
-              <a:lumMod val="60000"/>
-              <a:lumOff val="40000"/>
+            <a:schemeClr val="bg1">
+              <a:lumMod val="65000"/>
             </a:schemeClr>
           </a:solidFill>
         </p:spPr>
@@ -3553,9 +3566,8 @@
             <a:avLst/>
           </a:prstGeom>
           <a:solidFill>
-            <a:schemeClr val="accent1">
-              <a:lumMod val="60000"/>
-              <a:lumOff val="40000"/>
+            <a:schemeClr val="bg1">
+              <a:lumMod val="65000"/>
             </a:schemeClr>
           </a:solidFill>
         </p:spPr>
@@ -3617,9 +3629,8 @@
             <a:avLst/>
           </a:prstGeom>
           <a:solidFill>
-            <a:schemeClr val="accent1">
-              <a:lumMod val="60000"/>
-              <a:lumOff val="40000"/>
+            <a:schemeClr val="bg1">
+              <a:lumMod val="65000"/>
             </a:schemeClr>
           </a:solidFill>
         </p:spPr>
@@ -3752,12 +3763,7 @@
           <a:prstGeom prst="roundRect">
             <a:avLst/>
           </a:prstGeom>
-          <a:solidFill>
-            <a:schemeClr val="accent1">
-              <a:lumMod val="60000"/>
-              <a:lumOff val="40000"/>
-            </a:schemeClr>
-          </a:solidFill>
+          <a:noFill/>
         </p:spPr>
         <p:style>
           <a:lnRef idx="2">
@@ -4009,7 +4015,7 @@
           <a:p>
             <a:r>
               <a:rPr lang="fi-FI" dirty="0"/>
-              <a:t>Navigointi?</a:t>
+              <a:t>Main pääsivu</a:t>
             </a:r>
             <a:endParaRPr lang="en-GB" dirty="0"/>
           </a:p>
@@ -4058,94 +4064,6 @@
             <a:r>
               <a:rPr lang="fi-FI" dirty="0" err="1"/>
               <a:t>Mayhem</a:t>
-            </a:r>
-            <a:endParaRPr lang="en-GB" dirty="0"/>
-          </a:p>
-        </p:txBody>
-      </p:sp>
-      <p:sp>
-        <p:nvSpPr>
-          <p:cNvPr id="19" name="Suorakulmio: Pyöristetyt kulmat 18">
-            <a:extLst>
-              <a:ext uri="{FF2B5EF4-FFF2-40B4-BE49-F238E27FC236}">
-                <a16:creationId xmlns:a16="http://schemas.microsoft.com/office/drawing/2014/main" id="{7AC640C5-682C-AAB2-AF1B-5105B8ECFA4A}"/>
-              </a:ext>
-            </a:extLst>
-          </p:cNvPr>
-          <p:cNvSpPr/>
-          <p:nvPr/>
-        </p:nvSpPr>
-        <p:spPr>
-          <a:xfrm>
-            <a:off x="10553347" y="5981057"/>
-            <a:ext cx="721455" cy="523217"/>
-          </a:xfrm>
-          <a:prstGeom prst="roundRect">
-            <a:avLst/>
-          </a:prstGeom>
-          <a:solidFill>
-            <a:schemeClr val="accent1">
-              <a:lumMod val="60000"/>
-              <a:lumOff val="40000"/>
-            </a:schemeClr>
-          </a:solidFill>
-        </p:spPr>
-        <p:style>
-          <a:lnRef idx="2">
-            <a:schemeClr val="accent1">
-              <a:shade val="50000"/>
-            </a:schemeClr>
-          </a:lnRef>
-          <a:fillRef idx="1">
-            <a:schemeClr val="accent1"/>
-          </a:fillRef>
-          <a:effectRef idx="0">
-            <a:schemeClr val="accent1"/>
-          </a:effectRef>
-          <a:fontRef idx="minor">
-            <a:schemeClr val="lt1"/>
-          </a:fontRef>
-        </p:style>
-        <p:txBody>
-          <a:bodyPr rtlCol="0" anchor="ctr"/>
-          <a:lstStyle/>
-          <a:p>
-            <a:pPr algn="ctr"/>
-            <a:endParaRPr lang="en-GB"/>
-          </a:p>
-        </p:txBody>
-      </p:sp>
-      <p:sp>
-        <p:nvSpPr>
-          <p:cNvPr id="20" name="Tekstiruutu 19">
-            <a:extLst>
-              <a:ext uri="{FF2B5EF4-FFF2-40B4-BE49-F238E27FC236}">
-                <a16:creationId xmlns:a16="http://schemas.microsoft.com/office/drawing/2014/main" id="{02A6B22E-CFA7-0F37-1276-0AB12B9A0A0B}"/>
-              </a:ext>
-            </a:extLst>
-          </p:cNvPr>
-          <p:cNvSpPr txBox="1"/>
-          <p:nvPr/>
-        </p:nvSpPr>
-        <p:spPr>
-          <a:xfrm>
-            <a:off x="10584805" y="6049963"/>
-            <a:ext cx="658539" cy="369332"/>
-          </a:xfrm>
-          <a:prstGeom prst="rect">
-            <a:avLst/>
-          </a:prstGeom>
-          <a:noFill/>
-        </p:spPr>
-        <p:txBody>
-          <a:bodyPr wrap="square" rtlCol="0">
-            <a:spAutoFit/>
-          </a:bodyPr>
-          <a:lstStyle/>
-          <a:p>
-            <a:r>
-              <a:rPr lang="fi-FI" dirty="0" err="1"/>
-              <a:t>Print</a:t>
             </a:r>
             <a:endParaRPr lang="en-GB" dirty="0"/>
           </a:p>
@@ -4183,73 +4101,41 @@
       </p:grpSpPr>
       <p:sp>
         <p:nvSpPr>
-          <p:cNvPr id="2" name="Tekstiruutu 1">
-            <a:extLst>
-              <a:ext uri="{FF2B5EF4-FFF2-40B4-BE49-F238E27FC236}">
-                <a16:creationId xmlns:a16="http://schemas.microsoft.com/office/drawing/2014/main" id="{AB075D4F-18F8-1B96-CDCC-1139C12BDAD4}"/>
-              </a:ext>
-            </a:extLst>
-          </p:cNvPr>
-          <p:cNvSpPr txBox="1"/>
+          <p:cNvPr id="3" name="Suorakulmio: Pyöristetyt kulmat 2">
+            <a:extLst>
+              <a:ext uri="{FF2B5EF4-FFF2-40B4-BE49-F238E27FC236}">
+                <a16:creationId xmlns:a16="http://schemas.microsoft.com/office/drawing/2014/main" id="{D177DC90-C96D-FBA8-1F79-2D83BACB66F0}"/>
+              </a:ext>
+            </a:extLst>
+          </p:cNvPr>
+          <p:cNvSpPr/>
           <p:nvPr/>
         </p:nvSpPr>
         <p:spPr>
           <a:xfrm>
-            <a:off x="1946246" y="411061"/>
-            <a:ext cx="7189365" cy="369332"/>
-          </a:xfrm>
-          <a:prstGeom prst="rect">
+            <a:off x="1819920" y="5606760"/>
+            <a:ext cx="1084385" cy="581891"/>
+          </a:xfrm>
+          <a:prstGeom prst="roundRect">
             <a:avLst/>
           </a:prstGeom>
-          <a:noFill/>
-        </p:spPr>
-        <p:txBody>
-          <a:bodyPr wrap="square" rtlCol="0">
-            <a:spAutoFit/>
-          </a:bodyPr>
-          <a:lstStyle/>
-          <a:p>
-            <a:r>
-              <a:rPr lang="fi-FI" dirty="0"/>
-              <a:t>Lisää asiakas välilehti</a:t>
-            </a:r>
-            <a:endParaRPr lang="en-GB" dirty="0"/>
-          </a:p>
-        </p:txBody>
-      </p:sp>
-      <p:sp>
-        <p:nvSpPr>
-          <p:cNvPr id="3" name="Suorakulmio 2">
-            <a:extLst>
-              <a:ext uri="{FF2B5EF4-FFF2-40B4-BE49-F238E27FC236}">
-                <a16:creationId xmlns:a16="http://schemas.microsoft.com/office/drawing/2014/main" id="{75C9AC93-5E11-DFB8-4892-FD666B3AD316}"/>
-              </a:ext>
-            </a:extLst>
-          </p:cNvPr>
-          <p:cNvSpPr/>
-          <p:nvPr/>
-        </p:nvSpPr>
-        <p:spPr>
-          <a:xfrm>
-            <a:off x="1015068" y="1317072"/>
-            <a:ext cx="10654018" cy="4320330"/>
-          </a:xfrm>
-          <a:prstGeom prst="rect">
-            <a:avLst/>
-          </a:prstGeom>
-          <a:noFill/>
+          <a:solidFill>
+            <a:schemeClr val="bg1">
+              <a:lumMod val="75000"/>
+            </a:schemeClr>
+          </a:solidFill>
         </p:spPr>
         <p:style>
           <a:lnRef idx="2">
-            <a:schemeClr val="accent1">
+            <a:schemeClr val="accent5">
               <a:shade val="50000"/>
             </a:schemeClr>
           </a:lnRef>
           <a:fillRef idx="1">
-            <a:schemeClr val="accent1"/>
+            <a:schemeClr val="accent5"/>
           </a:fillRef>
           <a:effectRef idx="0">
-            <a:schemeClr val="accent1"/>
+            <a:schemeClr val="accent5"/>
           </a:effectRef>
           <a:fontRef idx="minor">
             <a:schemeClr val="lt1"/>
@@ -4260,16 +4146,28 @@
           <a:lstStyle/>
           <a:p>
             <a:pPr algn="ctr"/>
-            <a:endParaRPr lang="en-GB"/>
-          </a:p>
-        </p:txBody>
-      </p:sp>
-      <p:sp>
-        <p:nvSpPr>
-          <p:cNvPr id="4" name="Tekstiruutu 3">
-            <a:extLst>
-              <a:ext uri="{FF2B5EF4-FFF2-40B4-BE49-F238E27FC236}">
-                <a16:creationId xmlns:a16="http://schemas.microsoft.com/office/drawing/2014/main" id="{90FFE3FF-B3EB-6562-4F5F-C5284BF29F75}"/>
+            <a:endParaRPr lang="en-GB">
+              <a:ln w="0"/>
+              <a:solidFill>
+                <a:schemeClr val="tx1"/>
+              </a:solidFill>
+              <a:effectLst>
+                <a:outerShdw blurRad="38100" dist="19050" dir="2700000" algn="tl" rotWithShape="0">
+                  <a:schemeClr val="dk1">
+                    <a:alpha val="40000"/>
+                  </a:schemeClr>
+                </a:outerShdw>
+              </a:effectLst>
+            </a:endParaRPr>
+          </a:p>
+        </p:txBody>
+      </p:sp>
+      <p:sp>
+        <p:nvSpPr>
+          <p:cNvPr id="7" name="Tekstiruutu 6">
+            <a:extLst>
+              <a:ext uri="{FF2B5EF4-FFF2-40B4-BE49-F238E27FC236}">
+                <a16:creationId xmlns:a16="http://schemas.microsoft.com/office/drawing/2014/main" id="{A464CC0F-6F29-ABDF-9D43-F0D41E3FC4F5}"/>
               </a:ext>
             </a:extLst>
           </p:cNvPr>
@@ -4278,8 +4176,8 @@
         </p:nvSpPr>
         <p:spPr>
           <a:xfrm>
-            <a:off x="4446165" y="1255791"/>
-            <a:ext cx="2952925" cy="369332"/>
+            <a:off x="159798" y="213064"/>
+            <a:ext cx="2024109" cy="369332"/>
           </a:xfrm>
           <a:prstGeom prst="rect">
             <a:avLst/>
@@ -4294,7 +4192,7 @@
           <a:p>
             <a:r>
               <a:rPr lang="fi-FI" dirty="0"/>
-              <a:t>Lisää asiakas ja laskutus</a:t>
+              <a:t>Asiakkaan tiedot</a:t>
             </a:r>
             <a:endParaRPr lang="en-GB" dirty="0"/>
           </a:p>
@@ -4302,10 +4200,10 @@
       </p:sp>
       <p:sp>
         <p:nvSpPr>
-          <p:cNvPr id="13" name="Suorakulmio: Pyöristetyt kulmat 12">
-            <a:extLst>
-              <a:ext uri="{FF2B5EF4-FFF2-40B4-BE49-F238E27FC236}">
-                <a16:creationId xmlns:a16="http://schemas.microsoft.com/office/drawing/2014/main" id="{00DA7FAA-513F-D829-CD96-B56406EEB629}"/>
+          <p:cNvPr id="8" name="Suorakulmio 7">
+            <a:extLst>
+              <a:ext uri="{FF2B5EF4-FFF2-40B4-BE49-F238E27FC236}">
+                <a16:creationId xmlns:a16="http://schemas.microsoft.com/office/drawing/2014/main" id="{EA89451E-D14D-9832-8FD9-216E4159616A}"/>
               </a:ext>
             </a:extLst>
           </p:cNvPr>
@@ -4314,30 +4212,77 @@
         </p:nvSpPr>
         <p:spPr>
           <a:xfrm>
-            <a:off x="7441035" y="5054183"/>
-            <a:ext cx="4135773" cy="503307"/>
+            <a:off x="159798" y="683581"/>
+            <a:ext cx="2876365" cy="369332"/>
+          </a:xfrm>
+          <a:prstGeom prst="rect">
+            <a:avLst/>
+          </a:prstGeom>
+        </p:spPr>
+        <p:style>
+          <a:lnRef idx="2">
+            <a:schemeClr val="accent6"/>
+          </a:lnRef>
+          <a:fillRef idx="1">
+            <a:schemeClr val="lt1"/>
+          </a:fillRef>
+          <a:effectRef idx="0">
+            <a:schemeClr val="accent6"/>
+          </a:effectRef>
+          <a:fontRef idx="minor">
+            <a:schemeClr val="dk1"/>
+          </a:fontRef>
+        </p:style>
+        <p:txBody>
+          <a:bodyPr rtlCol="0" anchor="ctr"/>
+          <a:lstStyle/>
+          <a:p>
+            <a:pPr algn="ctr"/>
+            <a:r>
+              <a:rPr lang="fi-FI" dirty="0"/>
+              <a:t>Asiakkaan nimi</a:t>
+            </a:r>
+            <a:endParaRPr lang="en-GB" dirty="0"/>
+          </a:p>
+        </p:txBody>
+      </p:sp>
+      <p:sp>
+        <p:nvSpPr>
+          <p:cNvPr id="9" name="Suorakulmio: Pyöristetyt kulmat 8">
+            <a:extLst>
+              <a:ext uri="{FF2B5EF4-FFF2-40B4-BE49-F238E27FC236}">
+                <a16:creationId xmlns:a16="http://schemas.microsoft.com/office/drawing/2014/main" id="{901DB777-303D-820C-B20F-B713A1753C73}"/>
+              </a:ext>
+            </a:extLst>
+          </p:cNvPr>
+          <p:cNvSpPr/>
+          <p:nvPr/>
+        </p:nvSpPr>
+        <p:spPr>
+          <a:xfrm>
+            <a:off x="163722" y="5606760"/>
+            <a:ext cx="1154752" cy="581891"/>
           </a:xfrm>
           <a:prstGeom prst="roundRect">
             <a:avLst/>
           </a:prstGeom>
           <a:solidFill>
-            <a:schemeClr val="accent1">
-              <a:lumMod val="20000"/>
-              <a:lumOff val="80000"/>
+            <a:schemeClr val="bg1">
+              <a:lumMod val="75000"/>
             </a:schemeClr>
           </a:solidFill>
         </p:spPr>
         <p:style>
           <a:lnRef idx="2">
-            <a:schemeClr val="accent1">
+            <a:schemeClr val="accent5">
               <a:shade val="50000"/>
             </a:schemeClr>
           </a:lnRef>
           <a:fillRef idx="1">
-            <a:schemeClr val="accent1"/>
+            <a:schemeClr val="accent5"/>
           </a:fillRef>
           <a:effectRef idx="0">
-            <a:schemeClr val="accent1"/>
+            <a:schemeClr val="accent5"/>
           </a:effectRef>
           <a:fontRef idx="minor">
             <a:schemeClr val="lt1"/>
@@ -4348,79 +4293,59 @@
           <a:lstStyle/>
           <a:p>
             <a:pPr algn="ctr"/>
-            <a:endParaRPr lang="en-GB"/>
-          </a:p>
-        </p:txBody>
-      </p:sp>
-      <p:sp>
-        <p:nvSpPr>
-          <p:cNvPr id="14" name="Tekstiruutu 13">
-            <a:extLst>
-              <a:ext uri="{FF2B5EF4-FFF2-40B4-BE49-F238E27FC236}">
-                <a16:creationId xmlns:a16="http://schemas.microsoft.com/office/drawing/2014/main" id="{B7FC8E03-3EF9-6364-71CA-3983E1060B95}"/>
-              </a:ext>
-            </a:extLst>
-          </p:cNvPr>
-          <p:cNvSpPr txBox="1"/>
+            <a:endParaRPr lang="en-GB">
+              <a:ln w="0"/>
+              <a:solidFill>
+                <a:schemeClr val="tx1"/>
+              </a:solidFill>
+              <a:effectLst>
+                <a:outerShdw blurRad="38100" dist="19050" dir="2700000" algn="tl" rotWithShape="0">
+                  <a:schemeClr val="dk1">
+                    <a:alpha val="40000"/>
+                  </a:schemeClr>
+                </a:outerShdw>
+              </a:effectLst>
+            </a:endParaRPr>
+          </a:p>
+        </p:txBody>
+      </p:sp>
+      <p:sp>
+        <p:nvSpPr>
+          <p:cNvPr id="11" name="Suorakulmio: Pyöristetyt kulmat 10">
+            <a:extLst>
+              <a:ext uri="{FF2B5EF4-FFF2-40B4-BE49-F238E27FC236}">
+                <a16:creationId xmlns:a16="http://schemas.microsoft.com/office/drawing/2014/main" id="{5A13BDE2-028C-A585-583C-4493906695D6}"/>
+              </a:ext>
+            </a:extLst>
+          </p:cNvPr>
+          <p:cNvSpPr/>
           <p:nvPr/>
         </p:nvSpPr>
         <p:spPr>
           <a:xfrm>
-            <a:off x="7571064" y="5121170"/>
-            <a:ext cx="3875714" cy="369332"/>
-          </a:xfrm>
-          <a:prstGeom prst="rect">
+            <a:off x="5296355" y="761967"/>
+            <a:ext cx="980158" cy="581891"/>
+          </a:xfrm>
+          <a:prstGeom prst="roundRect">
             <a:avLst/>
           </a:prstGeom>
-          <a:noFill/>
-        </p:spPr>
-        <p:txBody>
-          <a:bodyPr wrap="square" rtlCol="0">
-            <a:spAutoFit/>
-          </a:bodyPr>
-          <a:lstStyle/>
-          <a:p>
-            <a:r>
-              <a:rPr lang="fi-FI" dirty="0"/>
-              <a:t>Tallenna asiakas ja palvelutaso</a:t>
-            </a:r>
-            <a:endParaRPr lang="en-GB" dirty="0"/>
-          </a:p>
-        </p:txBody>
-      </p:sp>
-      <p:sp>
-        <p:nvSpPr>
-          <p:cNvPr id="17" name="Suorakulmio 16">
-            <a:extLst>
-              <a:ext uri="{FF2B5EF4-FFF2-40B4-BE49-F238E27FC236}">
-                <a16:creationId xmlns:a16="http://schemas.microsoft.com/office/drawing/2014/main" id="{707076B2-AED0-61C0-54A3-636D23A6E5BB}"/>
-              </a:ext>
-            </a:extLst>
-          </p:cNvPr>
-          <p:cNvSpPr/>
-          <p:nvPr/>
-        </p:nvSpPr>
-        <p:spPr>
-          <a:xfrm>
-            <a:off x="1149291" y="2032934"/>
-            <a:ext cx="2709645" cy="310392"/>
-          </a:xfrm>
-          <a:prstGeom prst="rect">
-            <a:avLst/>
-          </a:prstGeom>
-          <a:noFill/>
+          <a:solidFill>
+            <a:schemeClr val="bg1">
+              <a:lumMod val="75000"/>
+            </a:schemeClr>
+          </a:solidFill>
         </p:spPr>
         <p:style>
           <a:lnRef idx="2">
-            <a:schemeClr val="accent1">
+            <a:schemeClr val="accent5">
               <a:shade val="50000"/>
             </a:schemeClr>
           </a:lnRef>
           <a:fillRef idx="1">
-            <a:schemeClr val="accent1"/>
+            <a:schemeClr val="accent5"/>
           </a:fillRef>
           <a:effectRef idx="0">
-            <a:schemeClr val="accent1"/>
+            <a:schemeClr val="accent5"/>
           </a:effectRef>
           <a:fontRef idx="minor">
             <a:schemeClr val="lt1"/>
@@ -4431,43 +4356,167 @@
           <a:lstStyle/>
           <a:p>
             <a:pPr algn="ctr"/>
-            <a:endParaRPr lang="en-GB"/>
-          </a:p>
-        </p:txBody>
-      </p:sp>
-      <p:sp>
-        <p:nvSpPr>
-          <p:cNvPr id="19" name="Suorakulmio 18">
-            <a:extLst>
-              <a:ext uri="{FF2B5EF4-FFF2-40B4-BE49-F238E27FC236}">
-                <a16:creationId xmlns:a16="http://schemas.microsoft.com/office/drawing/2014/main" id="{5A1F64C3-1C4D-ADB3-02E9-79BF273768F2}"/>
-              </a:ext>
-            </a:extLst>
-          </p:cNvPr>
-          <p:cNvSpPr/>
+            <a:endParaRPr lang="en-GB">
+              <a:ln w="0"/>
+              <a:solidFill>
+                <a:schemeClr val="tx1"/>
+              </a:solidFill>
+              <a:effectLst>
+                <a:outerShdw blurRad="38100" dist="19050" dir="2700000" algn="tl" rotWithShape="0">
+                  <a:schemeClr val="dk1">
+                    <a:alpha val="40000"/>
+                  </a:schemeClr>
+                </a:outerShdw>
+              </a:effectLst>
+            </a:endParaRPr>
+          </a:p>
+        </p:txBody>
+      </p:sp>
+      <p:sp>
+        <p:nvSpPr>
+          <p:cNvPr id="12" name="Tekstiruutu 11">
+            <a:extLst>
+              <a:ext uri="{FF2B5EF4-FFF2-40B4-BE49-F238E27FC236}">
+                <a16:creationId xmlns:a16="http://schemas.microsoft.com/office/drawing/2014/main" id="{1C00913D-1C50-ED98-30A3-BF6531022917}"/>
+              </a:ext>
+            </a:extLst>
+          </p:cNvPr>
+          <p:cNvSpPr txBox="1"/>
           <p:nvPr/>
         </p:nvSpPr>
         <p:spPr>
           <a:xfrm>
-            <a:off x="1149290" y="3372501"/>
-            <a:ext cx="2709645" cy="310392"/>
+            <a:off x="214139" y="5713039"/>
+            <a:ext cx="1296139" cy="369332"/>
           </a:xfrm>
           <a:prstGeom prst="rect">
             <a:avLst/>
           </a:prstGeom>
           <a:noFill/>
         </p:spPr>
+        <p:txBody>
+          <a:bodyPr wrap="square" rtlCol="0">
+            <a:spAutoFit/>
+          </a:bodyPr>
+          <a:lstStyle/>
+          <a:p>
+            <a:r>
+              <a:rPr lang="fi-FI" dirty="0"/>
+              <a:t>Tallenna</a:t>
+            </a:r>
+            <a:endParaRPr lang="en-GB" dirty="0"/>
+          </a:p>
+        </p:txBody>
+      </p:sp>
+      <p:sp>
+        <p:nvSpPr>
+          <p:cNvPr id="13" name="Tekstiruutu 12">
+            <a:extLst>
+              <a:ext uri="{FF2B5EF4-FFF2-40B4-BE49-F238E27FC236}">
+                <a16:creationId xmlns:a16="http://schemas.microsoft.com/office/drawing/2014/main" id="{138FB05E-D1CD-56F3-4E87-2444A6558539}"/>
+              </a:ext>
+            </a:extLst>
+          </p:cNvPr>
+          <p:cNvSpPr txBox="1"/>
+          <p:nvPr/>
+        </p:nvSpPr>
+        <p:spPr>
+          <a:xfrm>
+            <a:off x="1901126" y="5713039"/>
+            <a:ext cx="1296139" cy="369332"/>
+          </a:xfrm>
+          <a:prstGeom prst="rect">
+            <a:avLst/>
+          </a:prstGeom>
+          <a:noFill/>
+        </p:spPr>
+        <p:txBody>
+          <a:bodyPr wrap="square" rtlCol="0">
+            <a:spAutoFit/>
+          </a:bodyPr>
+          <a:lstStyle/>
+          <a:p>
+            <a:r>
+              <a:rPr lang="fi-FI" dirty="0"/>
+              <a:t>Peruuta</a:t>
+            </a:r>
+            <a:endParaRPr lang="en-GB" dirty="0"/>
+          </a:p>
+        </p:txBody>
+      </p:sp>
+      <p:sp>
+        <p:nvSpPr>
+          <p:cNvPr id="14" name="Tekstiruutu 13">
+            <a:extLst>
+              <a:ext uri="{FF2B5EF4-FFF2-40B4-BE49-F238E27FC236}">
+                <a16:creationId xmlns:a16="http://schemas.microsoft.com/office/drawing/2014/main" id="{5D00ABCF-1B5E-06B2-239C-121E0551E005}"/>
+              </a:ext>
+            </a:extLst>
+          </p:cNvPr>
+          <p:cNvSpPr txBox="1"/>
+          <p:nvPr/>
+        </p:nvSpPr>
+        <p:spPr>
+          <a:xfrm>
+            <a:off x="5296356" y="868247"/>
+            <a:ext cx="1068934" cy="369332"/>
+          </a:xfrm>
+          <a:prstGeom prst="rect">
+            <a:avLst/>
+          </a:prstGeom>
+          <a:noFill/>
+        </p:spPr>
+        <p:txBody>
+          <a:bodyPr wrap="square" rtlCol="0">
+            <a:spAutoFit/>
+          </a:bodyPr>
+          <a:lstStyle/>
+          <a:p>
+            <a:r>
+              <a:rPr lang="fi-FI" dirty="0"/>
+              <a:t>Muokkaa</a:t>
+            </a:r>
+            <a:endParaRPr lang="en-GB" dirty="0"/>
+          </a:p>
+        </p:txBody>
+      </p:sp>
+      <p:sp>
+        <p:nvSpPr>
+          <p:cNvPr id="16" name="Suorakulmio: Pyöristetyt kulmat 15">
+            <a:extLst>
+              <a:ext uri="{FF2B5EF4-FFF2-40B4-BE49-F238E27FC236}">
+                <a16:creationId xmlns:a16="http://schemas.microsoft.com/office/drawing/2014/main" id="{14E7234A-23B6-BF1E-1C4A-E2168523BCE6}"/>
+              </a:ext>
+            </a:extLst>
+          </p:cNvPr>
+          <p:cNvSpPr/>
+          <p:nvPr/>
+        </p:nvSpPr>
+        <p:spPr>
+          <a:xfrm>
+            <a:off x="5296355" y="1557853"/>
+            <a:ext cx="980158" cy="581891"/>
+          </a:xfrm>
+          <a:prstGeom prst="roundRect">
+            <a:avLst/>
+          </a:prstGeom>
+          <a:solidFill>
+            <a:schemeClr val="bg1">
+              <a:lumMod val="75000"/>
+            </a:schemeClr>
+          </a:solidFill>
+        </p:spPr>
         <p:style>
           <a:lnRef idx="2">
-            <a:schemeClr val="accent1">
+            <a:schemeClr val="accent5">
               <a:shade val="50000"/>
             </a:schemeClr>
           </a:lnRef>
           <a:fillRef idx="1">
-            <a:schemeClr val="accent1"/>
+            <a:schemeClr val="accent5"/>
           </a:fillRef>
           <a:effectRef idx="0">
-            <a:schemeClr val="accent1"/>
+            <a:schemeClr val="accent5"/>
           </a:effectRef>
           <a:fontRef idx="minor">
             <a:schemeClr val="lt1"/>
@@ -4478,46 +4527,91 @@
           <a:lstStyle/>
           <a:p>
             <a:pPr algn="ctr"/>
-            <a:endParaRPr lang="en-GB"/>
-          </a:p>
-        </p:txBody>
-      </p:sp>
-      <p:sp>
-        <p:nvSpPr>
-          <p:cNvPr id="22" name="Suorakulmio 21">
-            <a:extLst>
-              <a:ext uri="{FF2B5EF4-FFF2-40B4-BE49-F238E27FC236}">
-                <a16:creationId xmlns:a16="http://schemas.microsoft.com/office/drawing/2014/main" id="{4764599B-CC1C-ACDC-AA1D-8B3FA644A9C7}"/>
-              </a:ext>
-            </a:extLst>
-          </p:cNvPr>
-          <p:cNvSpPr/>
+            <a:endParaRPr lang="en-GB">
+              <a:ln w="0"/>
+              <a:solidFill>
+                <a:schemeClr val="tx1"/>
+              </a:solidFill>
+              <a:effectLst>
+                <a:outerShdw blurRad="38100" dist="19050" dir="2700000" algn="tl" rotWithShape="0">
+                  <a:schemeClr val="dk1">
+                    <a:alpha val="40000"/>
+                  </a:schemeClr>
+                </a:outerShdw>
+              </a:effectLst>
+            </a:endParaRPr>
+          </a:p>
+        </p:txBody>
+      </p:sp>
+      <p:sp>
+        <p:nvSpPr>
+          <p:cNvPr id="17" name="Tekstiruutu 16">
+            <a:extLst>
+              <a:ext uri="{FF2B5EF4-FFF2-40B4-BE49-F238E27FC236}">
+                <a16:creationId xmlns:a16="http://schemas.microsoft.com/office/drawing/2014/main" id="{69B8808F-2126-D1DB-7429-E917A940BCE9}"/>
+              </a:ext>
+            </a:extLst>
+          </p:cNvPr>
+          <p:cNvSpPr txBox="1"/>
           <p:nvPr/>
         </p:nvSpPr>
         <p:spPr>
           <a:xfrm>
-            <a:off x="1149289" y="3839457"/>
-            <a:ext cx="2709645" cy="310392"/>
+            <a:off x="5402887" y="1664132"/>
+            <a:ext cx="1068934" cy="369332"/>
           </a:xfrm>
           <a:prstGeom prst="rect">
             <a:avLst/>
           </a:prstGeom>
           <a:noFill/>
         </p:spPr>
+        <p:txBody>
+          <a:bodyPr wrap="square" rtlCol="0">
+            <a:spAutoFit/>
+          </a:bodyPr>
+          <a:lstStyle/>
+          <a:p>
+            <a:r>
+              <a:rPr lang="fi-FI" dirty="0"/>
+              <a:t>Poista</a:t>
+            </a:r>
+            <a:endParaRPr lang="en-GB" dirty="0"/>
+          </a:p>
+        </p:txBody>
+      </p:sp>
+      <p:sp>
+        <p:nvSpPr>
+          <p:cNvPr id="18" name="Suorakulmio 17">
+            <a:extLst>
+              <a:ext uri="{FF2B5EF4-FFF2-40B4-BE49-F238E27FC236}">
+                <a16:creationId xmlns:a16="http://schemas.microsoft.com/office/drawing/2014/main" id="{CA7E3D2B-5B04-9854-57EE-45B328A3CEFF}"/>
+              </a:ext>
+            </a:extLst>
+          </p:cNvPr>
+          <p:cNvSpPr/>
+          <p:nvPr/>
+        </p:nvSpPr>
+        <p:spPr>
+          <a:xfrm>
+            <a:off x="159798" y="1294800"/>
+            <a:ext cx="2876365" cy="369332"/>
+          </a:xfrm>
+          <a:prstGeom prst="rect">
+            <a:avLst/>
+          </a:prstGeom>
+        </p:spPr>
         <p:style>
           <a:lnRef idx="2">
-            <a:schemeClr val="accent1">
-              <a:shade val="50000"/>
-            </a:schemeClr>
+            <a:schemeClr val="accent6"/>
           </a:lnRef>
           <a:fillRef idx="1">
-            <a:schemeClr val="accent1"/>
+            <a:schemeClr val="lt1"/>
           </a:fillRef>
           <a:effectRef idx="0">
-            <a:schemeClr val="accent1"/>
+            <a:schemeClr val="accent6"/>
           </a:effectRef>
           <a:fontRef idx="minor">
-            <a:schemeClr val="lt1"/>
+            <a:schemeClr val="dk1"/>
           </a:fontRef>
         </p:style>
         <p:txBody>
@@ -4525,16 +4619,20 @@
           <a:lstStyle/>
           <a:p>
             <a:pPr algn="ctr"/>
-            <a:endParaRPr lang="en-GB"/>
-          </a:p>
-        </p:txBody>
-      </p:sp>
-      <p:sp>
-        <p:nvSpPr>
-          <p:cNvPr id="23" name="Suorakulmio 22">
-            <a:extLst>
-              <a:ext uri="{FF2B5EF4-FFF2-40B4-BE49-F238E27FC236}">
-                <a16:creationId xmlns:a16="http://schemas.microsoft.com/office/drawing/2014/main" id="{2E41787A-3B20-C456-DDA3-86C49CEB88EC}"/>
+            <a:r>
+              <a:rPr lang="fi-FI" dirty="0"/>
+              <a:t>katuosoite</a:t>
+            </a:r>
+            <a:endParaRPr lang="en-GB" dirty="0"/>
+          </a:p>
+        </p:txBody>
+      </p:sp>
+      <p:sp>
+        <p:nvSpPr>
+          <p:cNvPr id="19" name="Suorakulmio 18">
+            <a:extLst>
+              <a:ext uri="{FF2B5EF4-FFF2-40B4-BE49-F238E27FC236}">
+                <a16:creationId xmlns:a16="http://schemas.microsoft.com/office/drawing/2014/main" id="{EFBB3217-8B07-CAA8-D46E-D5F87CA16887}"/>
               </a:ext>
             </a:extLst>
           </p:cNvPr>
@@ -4543,75 +4641,420 @@
         </p:nvSpPr>
         <p:spPr>
           <a:xfrm>
-            <a:off x="1149291" y="2473450"/>
-            <a:ext cx="2709645" cy="310392"/>
+            <a:off x="159798" y="1848798"/>
+            <a:ext cx="2876365" cy="369332"/>
+          </a:xfrm>
+          <a:prstGeom prst="rect">
+            <a:avLst/>
+          </a:prstGeom>
+        </p:spPr>
+        <p:style>
+          <a:lnRef idx="2">
+            <a:schemeClr val="accent6"/>
+          </a:lnRef>
+          <a:fillRef idx="1">
+            <a:schemeClr val="lt1"/>
+          </a:fillRef>
+          <a:effectRef idx="0">
+            <a:schemeClr val="accent6"/>
+          </a:effectRef>
+          <a:fontRef idx="minor">
+            <a:schemeClr val="dk1"/>
+          </a:fontRef>
+        </p:style>
+        <p:txBody>
+          <a:bodyPr rtlCol="0" anchor="ctr"/>
+          <a:lstStyle/>
+          <a:p>
+            <a:pPr algn="ctr"/>
+            <a:r>
+              <a:rPr lang="fi-FI" dirty="0"/>
+              <a:t>Postinumero</a:t>
+            </a:r>
+            <a:endParaRPr lang="en-GB" dirty="0"/>
+          </a:p>
+        </p:txBody>
+      </p:sp>
+      <p:sp>
+        <p:nvSpPr>
+          <p:cNvPr id="20" name="Suorakulmio 19">
+            <a:extLst>
+              <a:ext uri="{FF2B5EF4-FFF2-40B4-BE49-F238E27FC236}">
+                <a16:creationId xmlns:a16="http://schemas.microsoft.com/office/drawing/2014/main" id="{32ECAD50-9A6A-FE79-5F4B-2603F67CBBD2}"/>
+              </a:ext>
+            </a:extLst>
+          </p:cNvPr>
+          <p:cNvSpPr/>
+          <p:nvPr/>
+        </p:nvSpPr>
+        <p:spPr>
+          <a:xfrm>
+            <a:off x="159798" y="2431035"/>
+            <a:ext cx="2876365" cy="369332"/>
+          </a:xfrm>
+          <a:prstGeom prst="rect">
+            <a:avLst/>
+          </a:prstGeom>
+        </p:spPr>
+        <p:style>
+          <a:lnRef idx="2">
+            <a:schemeClr val="accent6"/>
+          </a:lnRef>
+          <a:fillRef idx="1">
+            <a:schemeClr val="lt1"/>
+          </a:fillRef>
+          <a:effectRef idx="0">
+            <a:schemeClr val="accent6"/>
+          </a:effectRef>
+          <a:fontRef idx="minor">
+            <a:schemeClr val="dk1"/>
+          </a:fontRef>
+        </p:style>
+        <p:txBody>
+          <a:bodyPr rtlCol="0" anchor="ctr"/>
+          <a:lstStyle/>
+          <a:p>
+            <a:pPr algn="ctr"/>
+            <a:r>
+              <a:rPr lang="fi-FI" dirty="0"/>
+              <a:t>kaupunki</a:t>
+            </a:r>
+            <a:endParaRPr lang="en-GB" dirty="0"/>
+          </a:p>
+        </p:txBody>
+      </p:sp>
+      <p:sp>
+        <p:nvSpPr>
+          <p:cNvPr id="21" name="Suorakulmio 20">
+            <a:extLst>
+              <a:ext uri="{FF2B5EF4-FFF2-40B4-BE49-F238E27FC236}">
+                <a16:creationId xmlns:a16="http://schemas.microsoft.com/office/drawing/2014/main" id="{F24B0923-EA27-BC2E-9C3C-A20F16058712}"/>
+              </a:ext>
+            </a:extLst>
+          </p:cNvPr>
+          <p:cNvSpPr/>
+          <p:nvPr/>
+        </p:nvSpPr>
+        <p:spPr>
+          <a:xfrm>
+            <a:off x="159798" y="3120468"/>
+            <a:ext cx="2876365" cy="369332"/>
+          </a:xfrm>
+          <a:prstGeom prst="rect">
+            <a:avLst/>
+          </a:prstGeom>
+        </p:spPr>
+        <p:style>
+          <a:lnRef idx="2">
+            <a:schemeClr val="accent6"/>
+          </a:lnRef>
+          <a:fillRef idx="1">
+            <a:schemeClr val="lt1"/>
+          </a:fillRef>
+          <a:effectRef idx="0">
+            <a:schemeClr val="accent6"/>
+          </a:effectRef>
+          <a:fontRef idx="minor">
+            <a:schemeClr val="dk1"/>
+          </a:fontRef>
+        </p:style>
+        <p:txBody>
+          <a:bodyPr rtlCol="0" anchor="ctr"/>
+          <a:lstStyle/>
+          <a:p>
+            <a:pPr algn="ctr"/>
+            <a:r>
+              <a:rPr lang="fi-FI" dirty="0"/>
+              <a:t>Sähköposti</a:t>
+            </a:r>
+            <a:endParaRPr lang="en-GB" dirty="0"/>
+          </a:p>
+        </p:txBody>
+      </p:sp>
+      <p:sp>
+        <p:nvSpPr>
+          <p:cNvPr id="22" name="Suorakulmio 21">
+            <a:extLst>
+              <a:ext uri="{FF2B5EF4-FFF2-40B4-BE49-F238E27FC236}">
+                <a16:creationId xmlns:a16="http://schemas.microsoft.com/office/drawing/2014/main" id="{6D4E038B-3DFC-4E96-F992-0CC05B2008A3}"/>
+              </a:ext>
+            </a:extLst>
+          </p:cNvPr>
+          <p:cNvSpPr/>
+          <p:nvPr/>
+        </p:nvSpPr>
+        <p:spPr>
+          <a:xfrm>
+            <a:off x="159797" y="4100276"/>
+            <a:ext cx="2876365" cy="369332"/>
+          </a:xfrm>
+          <a:prstGeom prst="rect">
+            <a:avLst/>
+          </a:prstGeom>
+        </p:spPr>
+        <p:style>
+          <a:lnRef idx="2">
+            <a:schemeClr val="accent6"/>
+          </a:lnRef>
+          <a:fillRef idx="1">
+            <a:schemeClr val="lt1"/>
+          </a:fillRef>
+          <a:effectRef idx="0">
+            <a:schemeClr val="accent6"/>
+          </a:effectRef>
+          <a:fontRef idx="minor">
+            <a:schemeClr val="dk1"/>
+          </a:fontRef>
+        </p:style>
+        <p:txBody>
+          <a:bodyPr rtlCol="0" anchor="ctr"/>
+          <a:lstStyle/>
+          <a:p>
+            <a:pPr algn="ctr"/>
+            <a:r>
+              <a:rPr lang="fi-FI" dirty="0"/>
+              <a:t>Select a </a:t>
+            </a:r>
+            <a:r>
+              <a:rPr lang="fi-FI" dirty="0" err="1"/>
+              <a:t>date</a:t>
+            </a:r>
+            <a:endParaRPr lang="en-GB" dirty="0"/>
+          </a:p>
+        </p:txBody>
+      </p:sp>
+      <p:sp>
+        <p:nvSpPr>
+          <p:cNvPr id="23" name="Suorakulmio 22">
+            <a:extLst>
+              <a:ext uri="{FF2B5EF4-FFF2-40B4-BE49-F238E27FC236}">
+                <a16:creationId xmlns:a16="http://schemas.microsoft.com/office/drawing/2014/main" id="{88E66872-4110-849B-B825-349CD0713A4A}"/>
+              </a:ext>
+            </a:extLst>
+          </p:cNvPr>
+          <p:cNvSpPr/>
+          <p:nvPr/>
+        </p:nvSpPr>
+        <p:spPr>
+          <a:xfrm>
+            <a:off x="159798" y="4974375"/>
+            <a:ext cx="2876365" cy="369332"/>
+          </a:xfrm>
+          <a:prstGeom prst="rect">
+            <a:avLst/>
+          </a:prstGeom>
+          <a:solidFill>
+            <a:schemeClr val="bg1">
+              <a:lumMod val="75000"/>
+            </a:schemeClr>
+          </a:solidFill>
+        </p:spPr>
+        <p:style>
+          <a:lnRef idx="2">
+            <a:schemeClr val="accent6"/>
+          </a:lnRef>
+          <a:fillRef idx="1">
+            <a:schemeClr val="lt1"/>
+          </a:fillRef>
+          <a:effectRef idx="0">
+            <a:schemeClr val="accent6"/>
+          </a:effectRef>
+          <a:fontRef idx="minor">
+            <a:schemeClr val="dk1"/>
+          </a:fontRef>
+        </p:style>
+        <p:txBody>
+          <a:bodyPr rtlCol="0" anchor="ctr"/>
+          <a:lstStyle/>
+          <a:p>
+            <a:pPr algn="ctr"/>
+            <a:endParaRPr lang="en-GB"/>
+          </a:p>
+        </p:txBody>
+      </p:sp>
+      <p:sp>
+        <p:nvSpPr>
+          <p:cNvPr id="24" name="Tekstiruutu 23">
+            <a:extLst>
+              <a:ext uri="{FF2B5EF4-FFF2-40B4-BE49-F238E27FC236}">
+                <a16:creationId xmlns:a16="http://schemas.microsoft.com/office/drawing/2014/main" id="{334D98F1-764A-1F17-4AEE-927014DF4F84}"/>
+              </a:ext>
+            </a:extLst>
+          </p:cNvPr>
+          <p:cNvSpPr txBox="1"/>
+          <p:nvPr/>
+        </p:nvSpPr>
+        <p:spPr>
+          <a:xfrm flipH="1">
+            <a:off x="159797" y="3725172"/>
+            <a:ext cx="2592256" cy="369332"/>
           </a:xfrm>
           <a:prstGeom prst="rect">
             <a:avLst/>
           </a:prstGeom>
           <a:noFill/>
         </p:spPr>
-        <p:style>
-          <a:lnRef idx="2">
-            <a:schemeClr val="accent1">
-              <a:shade val="50000"/>
-            </a:schemeClr>
-          </a:lnRef>
-          <a:fillRef idx="1">
-            <a:schemeClr val="accent1"/>
-          </a:fillRef>
-          <a:effectRef idx="0">
-            <a:schemeClr val="accent1"/>
-          </a:effectRef>
-          <a:fontRef idx="minor">
-            <a:schemeClr val="lt1"/>
-          </a:fontRef>
-        </p:style>
-        <p:txBody>
-          <a:bodyPr rtlCol="0" anchor="ctr"/>
-          <a:lstStyle/>
-          <a:p>
-            <a:pPr algn="ctr"/>
-            <a:endParaRPr lang="en-GB"/>
-          </a:p>
-        </p:txBody>
-      </p:sp>
-      <p:sp>
-        <p:nvSpPr>
-          <p:cNvPr id="24" name="Suorakulmio 23">
-            <a:extLst>
-              <a:ext uri="{FF2B5EF4-FFF2-40B4-BE49-F238E27FC236}">
-                <a16:creationId xmlns:a16="http://schemas.microsoft.com/office/drawing/2014/main" id="{E7A68D9C-855E-6635-50D8-E9DA05B52A7D}"/>
-              </a:ext>
-            </a:extLst>
-          </p:cNvPr>
-          <p:cNvSpPr/>
+        <p:txBody>
+          <a:bodyPr wrap="square" rtlCol="0">
+            <a:spAutoFit/>
+          </a:bodyPr>
+          <a:lstStyle/>
+          <a:p>
+            <a:r>
+              <a:rPr lang="fi-FI" dirty="0"/>
+              <a:t>laskutuspäivä</a:t>
+            </a:r>
+            <a:endParaRPr lang="en-GB" dirty="0"/>
+          </a:p>
+        </p:txBody>
+      </p:sp>
+      <p:sp>
+        <p:nvSpPr>
+          <p:cNvPr id="26" name="Tekstiruutu 25">
+            <a:extLst>
+              <a:ext uri="{FF2B5EF4-FFF2-40B4-BE49-F238E27FC236}">
+                <a16:creationId xmlns:a16="http://schemas.microsoft.com/office/drawing/2014/main" id="{69D6AD64-88E3-6B74-7448-EF0053B6ACE7}"/>
+              </a:ext>
+            </a:extLst>
+          </p:cNvPr>
+          <p:cNvSpPr txBox="1"/>
           <p:nvPr/>
         </p:nvSpPr>
         <p:spPr>
-          <a:xfrm>
-            <a:off x="1149289" y="2905387"/>
-            <a:ext cx="2709645" cy="310392"/>
+          <a:xfrm flipH="1">
+            <a:off x="109256" y="4575887"/>
+            <a:ext cx="2592256" cy="369332"/>
           </a:xfrm>
           <a:prstGeom prst="rect">
             <a:avLst/>
           </a:prstGeom>
           <a:noFill/>
         </p:spPr>
+        <p:txBody>
+          <a:bodyPr wrap="square" rtlCol="0">
+            <a:spAutoFit/>
+          </a:bodyPr>
+          <a:lstStyle/>
+          <a:p>
+            <a:r>
+              <a:rPr lang="fi-FI" dirty="0"/>
+              <a:t>Palvelutaso</a:t>
+            </a:r>
+            <a:endParaRPr lang="en-GB" dirty="0"/>
+          </a:p>
+        </p:txBody>
+      </p:sp>
+      <p:pic>
+        <p:nvPicPr>
+          <p:cNvPr id="28" name="Kuva 27" descr="Päiväkalenteri ääriviiva">
+            <a:extLst>
+              <a:ext uri="{FF2B5EF4-FFF2-40B4-BE49-F238E27FC236}">
+                <a16:creationId xmlns:a16="http://schemas.microsoft.com/office/drawing/2014/main" id="{C5D4C7E6-0A03-D89C-156D-CB0B5892E153}"/>
+              </a:ext>
+            </a:extLst>
+          </p:cNvPr>
+          <p:cNvPicPr>
+            <a:picLocks noChangeAspect="1"/>
+          </p:cNvPicPr>
+          <p:nvPr/>
+        </p:nvPicPr>
+        <p:blipFill>
+          <a:blip r:embed="rId2">
+            <a:extLst>
+              <a:ext uri="{28A0092B-C50C-407E-A947-70E740481C1C}">
+                <a14:useLocalDpi xmlns:a14="http://schemas.microsoft.com/office/drawing/2010/main" val="0"/>
+              </a:ext>
+              <a:ext uri="{96DAC541-7B7A-43D3-8B79-37D633B846F1}">
+                <asvg:svgBlip xmlns:asvg="http://schemas.microsoft.com/office/drawing/2016/SVG/main" r:embed="rId3"/>
+              </a:ext>
+            </a:extLst>
+          </a:blip>
+          <a:stretch>
+            <a:fillRect/>
+          </a:stretch>
+        </p:blipFill>
+        <p:spPr>
+          <a:xfrm>
+            <a:off x="2263817" y="3988225"/>
+            <a:ext cx="914400" cy="581891"/>
+          </a:xfrm>
+          <a:prstGeom prst="rect">
+            <a:avLst/>
+          </a:prstGeom>
+        </p:spPr>
+      </p:pic>
+      <p:pic>
+        <p:nvPicPr>
+          <p:cNvPr id="30" name="Kuva 29" descr="Alanuoli tasaisella täytöllä">
+            <a:extLst>
+              <a:ext uri="{FF2B5EF4-FFF2-40B4-BE49-F238E27FC236}">
+                <a16:creationId xmlns:a16="http://schemas.microsoft.com/office/drawing/2014/main" id="{A51B7887-3297-E51F-CB5F-1DADC39AD4E0}"/>
+              </a:ext>
+            </a:extLst>
+          </p:cNvPr>
+          <p:cNvPicPr>
+            <a:picLocks noChangeAspect="1"/>
+          </p:cNvPicPr>
+          <p:nvPr/>
+        </p:nvPicPr>
+        <p:blipFill>
+          <a:blip r:embed="rId4">
+            <a:extLst>
+              <a:ext uri="{28A0092B-C50C-407E-A947-70E740481C1C}">
+                <a14:useLocalDpi xmlns:a14="http://schemas.microsoft.com/office/drawing/2010/main" val="0"/>
+              </a:ext>
+              <a:ext uri="{96DAC541-7B7A-43D3-8B79-37D633B846F1}">
+                <asvg:svgBlip xmlns:asvg="http://schemas.microsoft.com/office/drawing/2016/SVG/main" r:embed="rId5"/>
+              </a:ext>
+            </a:extLst>
+          </a:blip>
+          <a:stretch>
+            <a:fillRect/>
+          </a:stretch>
+        </p:blipFill>
+        <p:spPr>
+          <a:xfrm>
+            <a:off x="2512749" y="5056462"/>
+            <a:ext cx="523413" cy="180965"/>
+          </a:xfrm>
+          <a:prstGeom prst="rect">
+            <a:avLst/>
+          </a:prstGeom>
+        </p:spPr>
+      </p:pic>
+      <p:sp>
+        <p:nvSpPr>
+          <p:cNvPr id="32" name="Suorakulmio 31">
+            <a:extLst>
+              <a:ext uri="{FF2B5EF4-FFF2-40B4-BE49-F238E27FC236}">
+                <a16:creationId xmlns:a16="http://schemas.microsoft.com/office/drawing/2014/main" id="{BFB87EE9-9651-9D6C-984D-5B340493DC4F}"/>
+              </a:ext>
+            </a:extLst>
+          </p:cNvPr>
+          <p:cNvSpPr/>
+          <p:nvPr/>
+        </p:nvSpPr>
+        <p:spPr>
+          <a:xfrm>
+            <a:off x="6696075" y="295275"/>
+            <a:ext cx="5143500" cy="6181725"/>
+          </a:xfrm>
+          <a:prstGeom prst="rect">
+            <a:avLst/>
+          </a:prstGeom>
+        </p:spPr>
         <p:style>
           <a:lnRef idx="2">
-            <a:schemeClr val="accent1">
-              <a:shade val="50000"/>
-            </a:schemeClr>
+            <a:schemeClr val="accent6"/>
           </a:lnRef>
           <a:fillRef idx="1">
-            <a:schemeClr val="accent1"/>
+            <a:schemeClr val="lt1"/>
           </a:fillRef>
           <a:effectRef idx="0">
-            <a:schemeClr val="accent1"/>
+            <a:schemeClr val="accent6"/>
           </a:effectRef>
           <a:fontRef idx="minor">
-            <a:schemeClr val="lt1"/>
+            <a:schemeClr val="dk1"/>
           </a:fontRef>
         </p:style>
         <p:txBody>
@@ -4625,10 +5068,10 @@
       </p:sp>
       <p:sp>
         <p:nvSpPr>
-          <p:cNvPr id="29" name="Suorakulmio 28">
-            <a:extLst>
-              <a:ext uri="{FF2B5EF4-FFF2-40B4-BE49-F238E27FC236}">
-                <a16:creationId xmlns:a16="http://schemas.microsoft.com/office/drawing/2014/main" id="{57AAF931-D8D0-F762-9F1D-61E6EAB3D0D2}"/>
+          <p:cNvPr id="33" name="Suorakulmio 32">
+            <a:extLst>
+              <a:ext uri="{FF2B5EF4-FFF2-40B4-BE49-F238E27FC236}">
+                <a16:creationId xmlns:a16="http://schemas.microsoft.com/office/drawing/2014/main" id="{10F37A71-F362-2102-34AF-3FD7C8D66260}"/>
               </a:ext>
             </a:extLst>
           </p:cNvPr>
@@ -4637,45 +5080,261 @@
         </p:nvSpPr>
         <p:spPr>
           <a:xfrm>
-            <a:off x="5771626" y="1995087"/>
-            <a:ext cx="1384184" cy="310392"/>
+            <a:off x="6705600" y="295275"/>
+            <a:ext cx="4962525" cy="287121"/>
+          </a:xfrm>
+          <a:prstGeom prst="rect">
+            <a:avLst/>
+          </a:prstGeom>
+        </p:spPr>
+        <p:style>
+          <a:lnRef idx="2">
+            <a:schemeClr val="accent6"/>
+          </a:lnRef>
+          <a:fillRef idx="1">
+            <a:schemeClr val="lt1"/>
+          </a:fillRef>
+          <a:effectRef idx="0">
+            <a:schemeClr val="accent6"/>
+          </a:effectRef>
+          <a:fontRef idx="minor">
+            <a:schemeClr val="dk1"/>
+          </a:fontRef>
+        </p:style>
+        <p:txBody>
+          <a:bodyPr rtlCol="0" anchor="ctr"/>
+          <a:lstStyle/>
+          <a:p>
+            <a:r>
+              <a:rPr lang="fi-FI" dirty="0" err="1"/>
+              <a:t>Nimi|Postinro|Kaupunki</a:t>
+            </a:r>
+            <a:endParaRPr lang="en-GB" dirty="0"/>
+          </a:p>
+        </p:txBody>
+      </p:sp>
+    </p:spTree>
+    <p:extLst>
+      <p:ext uri="{BB962C8B-B14F-4D97-AF65-F5344CB8AC3E}">
+        <p14:creationId xmlns:p14="http://schemas.microsoft.com/office/powerpoint/2010/main" val="3324588249"/>
+      </p:ext>
+    </p:extLst>
+  </p:cSld>
+  <p:clrMapOvr>
+    <a:masterClrMapping/>
+  </p:clrMapOvr>
+</p:sld>
+</file>
+
+<file path=ppt/slides/slide4.xml><?xml version="1.0" encoding="utf-8"?>
+<p:sld xmlns:a="http://schemas.openxmlformats.org/drawingml/2006/main" xmlns:r="http://schemas.openxmlformats.org/officeDocument/2006/relationships" xmlns:p="http://schemas.openxmlformats.org/presentationml/2006/main">
+  <p:cSld>
+    <p:spTree>
+      <p:nvGrpSpPr>
+        <p:cNvPr id="1" name=""/>
+        <p:cNvGrpSpPr/>
+        <p:nvPr/>
+      </p:nvGrpSpPr>
+      <p:grpSpPr>
+        <a:xfrm>
+          <a:off x="0" y="0"/>
+          <a:ext cx="0" cy="0"/>
+          <a:chOff x="0" y="0"/>
+          <a:chExt cx="0" cy="0"/>
+        </a:xfrm>
+      </p:grpSpPr>
+      <p:sp>
+        <p:nvSpPr>
+          <p:cNvPr id="2" name="Suorakulmio: Pyöristetyt kulmat 1">
+            <a:extLst>
+              <a:ext uri="{FF2B5EF4-FFF2-40B4-BE49-F238E27FC236}">
+                <a16:creationId xmlns:a16="http://schemas.microsoft.com/office/drawing/2014/main" id="{C9905E0D-4CA0-3EE4-C7BF-343910828E57}"/>
+              </a:ext>
+            </a:extLst>
+          </p:cNvPr>
+          <p:cNvSpPr/>
+          <p:nvPr/>
+        </p:nvSpPr>
+        <p:spPr>
+          <a:xfrm>
+            <a:off x="1438275" y="1962150"/>
+            <a:ext cx="2705100" cy="495300"/>
+          </a:xfrm>
+          <a:prstGeom prst="roundRect">
+            <a:avLst/>
+          </a:prstGeom>
+          <a:solidFill>
+            <a:schemeClr val="bg1">
+              <a:lumMod val="75000"/>
+            </a:schemeClr>
+          </a:solidFill>
+        </p:spPr>
+        <p:style>
+          <a:lnRef idx="2">
+            <a:schemeClr val="accent6"/>
+          </a:lnRef>
+          <a:fillRef idx="1">
+            <a:schemeClr val="lt1"/>
+          </a:fillRef>
+          <a:effectRef idx="0">
+            <a:schemeClr val="accent6"/>
+          </a:effectRef>
+          <a:fontRef idx="minor">
+            <a:schemeClr val="dk1"/>
+          </a:fontRef>
+        </p:style>
+        <p:txBody>
+          <a:bodyPr rtlCol="0" anchor="ctr"/>
+          <a:lstStyle/>
+          <a:p>
+            <a:pPr algn="ctr"/>
+            <a:r>
+              <a:rPr lang="fi-FI" dirty="0"/>
+              <a:t>Lisää palvelutaso ja hinta</a:t>
+            </a:r>
+            <a:endParaRPr lang="en-GB" dirty="0"/>
+          </a:p>
+        </p:txBody>
+      </p:sp>
+      <p:sp>
+        <p:nvSpPr>
+          <p:cNvPr id="3" name="Suorakulmio: Pyöristetyt kulmat 2">
+            <a:extLst>
+              <a:ext uri="{FF2B5EF4-FFF2-40B4-BE49-F238E27FC236}">
+                <a16:creationId xmlns:a16="http://schemas.microsoft.com/office/drawing/2014/main" id="{A3BBF74F-DE5D-71AB-D735-D141E46ABBDC}"/>
+              </a:ext>
+            </a:extLst>
+          </p:cNvPr>
+          <p:cNvSpPr/>
+          <p:nvPr/>
+        </p:nvSpPr>
+        <p:spPr>
+          <a:xfrm>
+            <a:off x="1438274" y="2676525"/>
+            <a:ext cx="2705100" cy="495300"/>
+          </a:xfrm>
+          <a:prstGeom prst="roundRect">
+            <a:avLst/>
+          </a:prstGeom>
+          <a:solidFill>
+            <a:schemeClr val="bg1">
+              <a:lumMod val="75000"/>
+            </a:schemeClr>
+          </a:solidFill>
+        </p:spPr>
+        <p:style>
+          <a:lnRef idx="2">
+            <a:schemeClr val="accent6"/>
+          </a:lnRef>
+          <a:fillRef idx="1">
+            <a:schemeClr val="lt1"/>
+          </a:fillRef>
+          <a:effectRef idx="0">
+            <a:schemeClr val="accent6"/>
+          </a:effectRef>
+          <a:fontRef idx="minor">
+            <a:schemeClr val="dk1"/>
+          </a:fontRef>
+        </p:style>
+        <p:txBody>
+          <a:bodyPr rtlCol="0" anchor="ctr"/>
+          <a:lstStyle/>
+          <a:p>
+            <a:pPr algn="ctr"/>
+            <a:r>
+              <a:rPr lang="fi-FI" dirty="0"/>
+              <a:t>Poista palvelutaso</a:t>
+            </a:r>
+            <a:endParaRPr lang="en-GB" dirty="0"/>
+          </a:p>
+        </p:txBody>
+      </p:sp>
+      <p:sp>
+        <p:nvSpPr>
+          <p:cNvPr id="4" name="Suorakulmio 3">
+            <a:extLst>
+              <a:ext uri="{FF2B5EF4-FFF2-40B4-BE49-F238E27FC236}">
+                <a16:creationId xmlns:a16="http://schemas.microsoft.com/office/drawing/2014/main" id="{A8BA4C61-E2CB-709C-CCDC-2054D2ED43AC}"/>
+              </a:ext>
+            </a:extLst>
+          </p:cNvPr>
+          <p:cNvSpPr/>
+          <p:nvPr/>
+        </p:nvSpPr>
+        <p:spPr>
+          <a:xfrm>
+            <a:off x="1362075" y="1219200"/>
+            <a:ext cx="2419350" cy="352425"/>
+          </a:xfrm>
+          <a:prstGeom prst="rect">
+            <a:avLst/>
+          </a:prstGeom>
+        </p:spPr>
+        <p:style>
+          <a:lnRef idx="2">
+            <a:schemeClr val="accent6"/>
+          </a:lnRef>
+          <a:fillRef idx="1">
+            <a:schemeClr val="lt1"/>
+          </a:fillRef>
+          <a:effectRef idx="0">
+            <a:schemeClr val="accent6"/>
+          </a:effectRef>
+          <a:fontRef idx="minor">
+            <a:schemeClr val="dk1"/>
+          </a:fontRef>
+        </p:style>
+        <p:txBody>
+          <a:bodyPr rtlCol="0" anchor="ctr"/>
+          <a:lstStyle/>
+          <a:p>
+            <a:pPr algn="ctr"/>
+            <a:endParaRPr lang="en-GB" dirty="0"/>
+          </a:p>
+        </p:txBody>
+      </p:sp>
+      <p:sp>
+        <p:nvSpPr>
+          <p:cNvPr id="5" name="Tekstiruutu 4">
+            <a:extLst>
+              <a:ext uri="{FF2B5EF4-FFF2-40B4-BE49-F238E27FC236}">
+                <a16:creationId xmlns:a16="http://schemas.microsoft.com/office/drawing/2014/main" id="{E99BFCC0-5A20-65C2-462B-84E010C6E5D1}"/>
+              </a:ext>
+            </a:extLst>
+          </p:cNvPr>
+          <p:cNvSpPr txBox="1"/>
+          <p:nvPr/>
+        </p:nvSpPr>
+        <p:spPr>
+          <a:xfrm>
+            <a:off x="1362075" y="740331"/>
+            <a:ext cx="2419350" cy="369332"/>
           </a:xfrm>
           <a:prstGeom prst="rect">
             <a:avLst/>
           </a:prstGeom>
           <a:noFill/>
         </p:spPr>
-        <p:style>
-          <a:lnRef idx="2">
-            <a:schemeClr val="accent1">
-              <a:shade val="50000"/>
-            </a:schemeClr>
-          </a:lnRef>
-          <a:fillRef idx="1">
-            <a:schemeClr val="accent1"/>
-          </a:fillRef>
-          <a:effectRef idx="0">
-            <a:schemeClr val="accent1"/>
-          </a:effectRef>
-          <a:fontRef idx="minor">
-            <a:schemeClr val="lt1"/>
-          </a:fontRef>
-        </p:style>
-        <p:txBody>
-          <a:bodyPr rtlCol="0" anchor="ctr"/>
-          <a:lstStyle/>
-          <a:p>
-            <a:pPr algn="ctr"/>
-            <a:endParaRPr lang="en-GB"/>
-          </a:p>
-        </p:txBody>
-      </p:sp>
-      <p:sp>
-        <p:nvSpPr>
-          <p:cNvPr id="30" name="Tekstiruutu 29">
-            <a:extLst>
-              <a:ext uri="{FF2B5EF4-FFF2-40B4-BE49-F238E27FC236}">
-                <a16:creationId xmlns:a16="http://schemas.microsoft.com/office/drawing/2014/main" id="{4060ACDA-80A5-D085-50CA-70F60285BF16}"/>
+        <p:txBody>
+          <a:bodyPr wrap="square" rtlCol="0">
+            <a:spAutoFit/>
+          </a:bodyPr>
+          <a:lstStyle/>
+          <a:p>
+            <a:r>
+              <a:rPr lang="fi-FI" dirty="0"/>
+              <a:t>Lisää Palvelutaso</a:t>
+            </a:r>
+            <a:endParaRPr lang="en-GB" dirty="0"/>
+          </a:p>
+        </p:txBody>
+      </p:sp>
+      <p:sp>
+        <p:nvSpPr>
+          <p:cNvPr id="6" name="Tekstiruutu 5">
+            <a:extLst>
+              <a:ext uri="{FF2B5EF4-FFF2-40B4-BE49-F238E27FC236}">
+                <a16:creationId xmlns:a16="http://schemas.microsoft.com/office/drawing/2014/main" id="{63DAFC2D-8068-D619-074F-2596C9151F11}"/>
               </a:ext>
             </a:extLst>
           </p:cNvPr>
@@ -4684,8 +5343,8 @@
         </p:nvSpPr>
         <p:spPr>
           <a:xfrm>
-            <a:off x="8836404" y="1619151"/>
-            <a:ext cx="2340528" cy="369332"/>
+            <a:off x="4143374" y="740331"/>
+            <a:ext cx="2419350" cy="369332"/>
           </a:xfrm>
           <a:prstGeom prst="rect">
             <a:avLst/>
@@ -4700,7 +5359,7 @@
           <a:p>
             <a:r>
               <a:rPr lang="fi-FI" dirty="0"/>
-              <a:t>Valitse palvelutaso</a:t>
+              <a:t>Lisää Kuukausihinta</a:t>
             </a:r>
             <a:endParaRPr lang="en-GB" dirty="0"/>
           </a:p>
@@ -4708,10 +5367,54 @@
       </p:sp>
       <p:sp>
         <p:nvSpPr>
-          <p:cNvPr id="31" name="Tekstiruutu 30">
-            <a:extLst>
-              <a:ext uri="{FF2B5EF4-FFF2-40B4-BE49-F238E27FC236}">
-                <a16:creationId xmlns:a16="http://schemas.microsoft.com/office/drawing/2014/main" id="{1E378078-BF99-C520-580C-D0839CB4002F}"/>
+          <p:cNvPr id="8" name="Suorakulmio 7">
+            <a:extLst>
+              <a:ext uri="{FF2B5EF4-FFF2-40B4-BE49-F238E27FC236}">
+                <a16:creationId xmlns:a16="http://schemas.microsoft.com/office/drawing/2014/main" id="{BC2FCFFB-821A-D5A4-F1C2-A5822BF2B1B9}"/>
+              </a:ext>
+            </a:extLst>
+          </p:cNvPr>
+          <p:cNvSpPr/>
+          <p:nvPr/>
+        </p:nvSpPr>
+        <p:spPr>
+          <a:xfrm>
+            <a:off x="4143374" y="1183481"/>
+            <a:ext cx="2419350" cy="352425"/>
+          </a:xfrm>
+          <a:prstGeom prst="rect">
+            <a:avLst/>
+          </a:prstGeom>
+        </p:spPr>
+        <p:style>
+          <a:lnRef idx="2">
+            <a:schemeClr val="accent6"/>
+          </a:lnRef>
+          <a:fillRef idx="1">
+            <a:schemeClr val="lt1"/>
+          </a:fillRef>
+          <a:effectRef idx="0">
+            <a:schemeClr val="accent6"/>
+          </a:effectRef>
+          <a:fontRef idx="minor">
+            <a:schemeClr val="dk1"/>
+          </a:fontRef>
+        </p:style>
+        <p:txBody>
+          <a:bodyPr rtlCol="0" anchor="ctr"/>
+          <a:lstStyle/>
+          <a:p>
+            <a:pPr algn="ctr"/>
+            <a:endParaRPr lang="en-GB" dirty="0"/>
+          </a:p>
+        </p:txBody>
+      </p:sp>
+      <p:sp>
+        <p:nvSpPr>
+          <p:cNvPr id="11" name="Tekstiruutu 10">
+            <a:extLst>
+              <a:ext uri="{FF2B5EF4-FFF2-40B4-BE49-F238E27FC236}">
+                <a16:creationId xmlns:a16="http://schemas.microsoft.com/office/drawing/2014/main" id="{7FB793AD-7A81-FB60-5C6F-FD7554051756}"/>
               </a:ext>
             </a:extLst>
           </p:cNvPr>
@@ -4720,8 +5423,8 @@
         </p:nvSpPr>
         <p:spPr>
           <a:xfrm>
-            <a:off x="1249960" y="1625123"/>
-            <a:ext cx="2189527" cy="369332"/>
+            <a:off x="8324849" y="740331"/>
+            <a:ext cx="2419350" cy="369332"/>
           </a:xfrm>
           <a:prstGeom prst="rect">
             <a:avLst/>
@@ -4736,7 +5439,7 @@
           <a:p>
             <a:r>
               <a:rPr lang="fi-FI" dirty="0"/>
-              <a:t>Lisää asiakas</a:t>
+              <a:t>Palvelutaso ja hinta</a:t>
             </a:r>
             <a:endParaRPr lang="en-GB" dirty="0"/>
           </a:p>
@@ -4744,10 +5447,10 @@
       </p:sp>
       <p:sp>
         <p:nvSpPr>
-          <p:cNvPr id="32" name="Suorakulmio 31">
-            <a:extLst>
-              <a:ext uri="{FF2B5EF4-FFF2-40B4-BE49-F238E27FC236}">
-                <a16:creationId xmlns:a16="http://schemas.microsoft.com/office/drawing/2014/main" id="{04220E37-638A-EAA2-9837-9DD33B071096}"/>
+          <p:cNvPr id="12" name="Suorakulmio 11">
+            <a:extLst>
+              <a:ext uri="{FF2B5EF4-FFF2-40B4-BE49-F238E27FC236}">
+                <a16:creationId xmlns:a16="http://schemas.microsoft.com/office/drawing/2014/main" id="{33EDD2A0-3303-A663-8395-0B645C62EC14}"/>
               </a:ext>
             </a:extLst>
           </p:cNvPr>
@@ -4756,30 +5459,25 @@
         </p:nvSpPr>
         <p:spPr>
           <a:xfrm>
-            <a:off x="6790885" y="2069673"/>
-            <a:ext cx="243282" cy="155196"/>
+            <a:off x="7534275" y="1284683"/>
+            <a:ext cx="4476750" cy="3774283"/>
           </a:xfrm>
           <a:prstGeom prst="rect">
             <a:avLst/>
           </a:prstGeom>
-          <a:solidFill>
-            <a:schemeClr val="bg1"/>
-          </a:solidFill>
         </p:spPr>
         <p:style>
           <a:lnRef idx="2">
-            <a:schemeClr val="accent1">
-              <a:shade val="50000"/>
-            </a:schemeClr>
+            <a:schemeClr val="accent6"/>
           </a:lnRef>
           <a:fillRef idx="1">
-            <a:schemeClr val="accent1"/>
+            <a:schemeClr val="lt1"/>
           </a:fillRef>
           <a:effectRef idx="0">
-            <a:schemeClr val="accent1"/>
+            <a:schemeClr val="accent6"/>
           </a:effectRef>
           <a:fontRef idx="minor">
-            <a:schemeClr val="lt1"/>
+            <a:schemeClr val="dk1"/>
           </a:fontRef>
         </p:style>
         <p:txBody>
@@ -4787,16 +5485,16 @@
           <a:lstStyle/>
           <a:p>
             <a:pPr algn="ctr"/>
-            <a:endParaRPr lang="en-GB"/>
-          </a:p>
-        </p:txBody>
-      </p:sp>
-      <p:sp>
-        <p:nvSpPr>
-          <p:cNvPr id="33" name="Suorakulmio 32">
-            <a:extLst>
-              <a:ext uri="{FF2B5EF4-FFF2-40B4-BE49-F238E27FC236}">
-                <a16:creationId xmlns:a16="http://schemas.microsoft.com/office/drawing/2014/main" id="{4739A235-5700-79D2-44D8-B00ABD0DEA3B}"/>
+            <a:endParaRPr lang="en-GB" dirty="0"/>
+          </a:p>
+        </p:txBody>
+      </p:sp>
+      <p:sp>
+        <p:nvSpPr>
+          <p:cNvPr id="14" name="Suorakulmio: Pyöristetyt kulmat 13">
+            <a:extLst>
+              <a:ext uri="{FF2B5EF4-FFF2-40B4-BE49-F238E27FC236}">
+                <a16:creationId xmlns:a16="http://schemas.microsoft.com/office/drawing/2014/main" id="{372B9C2C-44ED-138D-E5A5-0F011C93F685}"/>
               </a:ext>
             </a:extLst>
           </p:cNvPr>
@@ -4805,77 +5503,30 @@
         </p:nvSpPr>
         <p:spPr>
           <a:xfrm>
-            <a:off x="5771626" y="2485240"/>
-            <a:ext cx="1384184" cy="310392"/>
-          </a:xfrm>
-          <a:prstGeom prst="rect">
-            <a:avLst/>
-          </a:prstGeom>
-          <a:noFill/>
-        </p:spPr>
-        <p:style>
-          <a:lnRef idx="2">
-            <a:schemeClr val="accent1">
-              <a:shade val="50000"/>
-            </a:schemeClr>
-          </a:lnRef>
-          <a:fillRef idx="1">
-            <a:schemeClr val="accent1"/>
-          </a:fillRef>
-          <a:effectRef idx="0">
-            <a:schemeClr val="accent1"/>
-          </a:effectRef>
-          <a:fontRef idx="minor">
-            <a:schemeClr val="lt1"/>
-          </a:fontRef>
-        </p:style>
-        <p:txBody>
-          <a:bodyPr rtlCol="0" anchor="ctr"/>
-          <a:lstStyle/>
-          <a:p>
-            <a:pPr algn="ctr"/>
-            <a:endParaRPr lang="en-GB"/>
-          </a:p>
-        </p:txBody>
-      </p:sp>
-      <p:sp>
-        <p:nvSpPr>
-          <p:cNvPr id="34" name="Suorakulmio 33">
-            <a:extLst>
-              <a:ext uri="{FF2B5EF4-FFF2-40B4-BE49-F238E27FC236}">
-                <a16:creationId xmlns:a16="http://schemas.microsoft.com/office/drawing/2014/main" id="{ECF72E28-B7E5-BA09-21D7-2FA77E536FC9}"/>
-              </a:ext>
-            </a:extLst>
-          </p:cNvPr>
-          <p:cNvSpPr/>
-          <p:nvPr/>
-        </p:nvSpPr>
-        <p:spPr>
-          <a:xfrm>
-            <a:off x="6790885" y="2559826"/>
-            <a:ext cx="243282" cy="155196"/>
-          </a:xfrm>
-          <a:prstGeom prst="rect">
+            <a:off x="6972299" y="5643800"/>
+            <a:ext cx="1276351" cy="495300"/>
+          </a:xfrm>
+          <a:prstGeom prst="roundRect">
             <a:avLst/>
           </a:prstGeom>
           <a:solidFill>
-            <a:schemeClr val="bg1"/>
+            <a:schemeClr val="bg1">
+              <a:lumMod val="75000"/>
+            </a:schemeClr>
           </a:solidFill>
         </p:spPr>
         <p:style>
           <a:lnRef idx="2">
-            <a:schemeClr val="accent1">
-              <a:shade val="50000"/>
-            </a:schemeClr>
+            <a:schemeClr val="accent6"/>
           </a:lnRef>
           <a:fillRef idx="1">
-            <a:schemeClr val="accent1"/>
+            <a:schemeClr val="lt1"/>
           </a:fillRef>
           <a:effectRef idx="0">
-            <a:schemeClr val="accent1"/>
+            <a:schemeClr val="accent6"/>
           </a:effectRef>
           <a:fontRef idx="minor">
-            <a:schemeClr val="lt1"/>
+            <a:schemeClr val="dk1"/>
           </a:fontRef>
         </p:style>
         <p:txBody>
@@ -4883,16 +5534,20 @@
           <a:lstStyle/>
           <a:p>
             <a:pPr algn="ctr"/>
-            <a:endParaRPr lang="en-GB"/>
-          </a:p>
-        </p:txBody>
-      </p:sp>
-      <p:sp>
-        <p:nvSpPr>
-          <p:cNvPr id="37" name="Suorakulmio 36">
-            <a:extLst>
-              <a:ext uri="{FF2B5EF4-FFF2-40B4-BE49-F238E27FC236}">
-                <a16:creationId xmlns:a16="http://schemas.microsoft.com/office/drawing/2014/main" id="{2F4D52EE-E04C-F014-608C-992DFEE08DC3}"/>
+            <a:r>
+              <a:rPr lang="fi-FI" dirty="0"/>
+              <a:t>Tallenna</a:t>
+            </a:r>
+            <a:endParaRPr lang="en-GB" dirty="0"/>
+          </a:p>
+        </p:txBody>
+      </p:sp>
+      <p:sp>
+        <p:nvSpPr>
+          <p:cNvPr id="15" name="Suorakulmio: Pyöristetyt kulmat 14">
+            <a:extLst>
+              <a:ext uri="{FF2B5EF4-FFF2-40B4-BE49-F238E27FC236}">
+                <a16:creationId xmlns:a16="http://schemas.microsoft.com/office/drawing/2014/main" id="{833CC3E6-D232-4920-19D2-B972C2361D8D}"/>
               </a:ext>
             </a:extLst>
           </p:cNvPr>
@@ -4901,77 +5556,30 @@
         </p:nvSpPr>
         <p:spPr>
           <a:xfrm>
-            <a:off x="5771626" y="2960264"/>
-            <a:ext cx="1384184" cy="310392"/>
-          </a:xfrm>
-          <a:prstGeom prst="rect">
-            <a:avLst/>
-          </a:prstGeom>
-          <a:noFill/>
-        </p:spPr>
-        <p:style>
-          <a:lnRef idx="2">
-            <a:schemeClr val="accent1">
-              <a:shade val="50000"/>
-            </a:schemeClr>
-          </a:lnRef>
-          <a:fillRef idx="1">
-            <a:schemeClr val="accent1"/>
-          </a:fillRef>
-          <a:effectRef idx="0">
-            <a:schemeClr val="accent1"/>
-          </a:effectRef>
-          <a:fontRef idx="minor">
-            <a:schemeClr val="lt1"/>
-          </a:fontRef>
-        </p:style>
-        <p:txBody>
-          <a:bodyPr rtlCol="0" anchor="ctr"/>
-          <a:lstStyle/>
-          <a:p>
-            <a:pPr algn="ctr"/>
-            <a:endParaRPr lang="en-GB"/>
-          </a:p>
-        </p:txBody>
-      </p:sp>
-      <p:sp>
-        <p:nvSpPr>
-          <p:cNvPr id="38" name="Suorakulmio 37">
-            <a:extLst>
-              <a:ext uri="{FF2B5EF4-FFF2-40B4-BE49-F238E27FC236}">
-                <a16:creationId xmlns:a16="http://schemas.microsoft.com/office/drawing/2014/main" id="{1F167BDB-7CE6-76CD-C8D9-1CB4975A8A73}"/>
-              </a:ext>
-            </a:extLst>
-          </p:cNvPr>
-          <p:cNvSpPr/>
-          <p:nvPr/>
-        </p:nvSpPr>
-        <p:spPr>
-          <a:xfrm>
-            <a:off x="6790885" y="3034850"/>
-            <a:ext cx="243282" cy="155196"/>
-          </a:xfrm>
-          <a:prstGeom prst="rect">
+            <a:off x="9115424" y="5617606"/>
+            <a:ext cx="1152526" cy="495300"/>
+          </a:xfrm>
+          <a:prstGeom prst="roundRect">
             <a:avLst/>
           </a:prstGeom>
           <a:solidFill>
-            <a:schemeClr val="bg1"/>
+            <a:schemeClr val="bg1">
+              <a:lumMod val="75000"/>
+            </a:schemeClr>
           </a:solidFill>
         </p:spPr>
         <p:style>
           <a:lnRef idx="2">
-            <a:schemeClr val="accent1">
-              <a:shade val="50000"/>
-            </a:schemeClr>
+            <a:schemeClr val="accent6"/>
           </a:lnRef>
           <a:fillRef idx="1">
-            <a:schemeClr val="accent1"/>
+            <a:schemeClr val="lt1"/>
           </a:fillRef>
           <a:effectRef idx="0">
-            <a:schemeClr val="accent1"/>
+            <a:schemeClr val="accent6"/>
           </a:effectRef>
           <a:fontRef idx="minor">
-            <a:schemeClr val="lt1"/>
+            <a:schemeClr val="dk1"/>
           </a:fontRef>
         </p:style>
         <p:txBody>
@@ -4979,641 +5587,9 @@
           <a:lstStyle/>
           <a:p>
             <a:pPr algn="ctr"/>
-            <a:endParaRPr lang="en-GB"/>
-          </a:p>
-        </p:txBody>
-      </p:sp>
-      <p:sp>
-        <p:nvSpPr>
-          <p:cNvPr id="39" name="Suorakulmio 38">
-            <a:extLst>
-              <a:ext uri="{FF2B5EF4-FFF2-40B4-BE49-F238E27FC236}">
-                <a16:creationId xmlns:a16="http://schemas.microsoft.com/office/drawing/2014/main" id="{886E8EB9-9EE3-467A-7FF2-6B72E2BC5436}"/>
-              </a:ext>
-            </a:extLst>
-          </p:cNvPr>
-          <p:cNvSpPr/>
-          <p:nvPr/>
-        </p:nvSpPr>
-        <p:spPr>
-          <a:xfrm>
-            <a:off x="5771626" y="3416333"/>
-            <a:ext cx="1384184" cy="310392"/>
-          </a:xfrm>
-          <a:prstGeom prst="rect">
-            <a:avLst/>
-          </a:prstGeom>
-          <a:noFill/>
-        </p:spPr>
-        <p:style>
-          <a:lnRef idx="2">
-            <a:schemeClr val="accent1">
-              <a:shade val="50000"/>
-            </a:schemeClr>
-          </a:lnRef>
-          <a:fillRef idx="1">
-            <a:schemeClr val="accent1"/>
-          </a:fillRef>
-          <a:effectRef idx="0">
-            <a:schemeClr val="accent1"/>
-          </a:effectRef>
-          <a:fontRef idx="minor">
-            <a:schemeClr val="lt1"/>
-          </a:fontRef>
-        </p:style>
-        <p:txBody>
-          <a:bodyPr rtlCol="0" anchor="ctr"/>
-          <a:lstStyle/>
-          <a:p>
-            <a:pPr algn="ctr"/>
-            <a:endParaRPr lang="en-GB"/>
-          </a:p>
-        </p:txBody>
-      </p:sp>
-      <p:sp>
-        <p:nvSpPr>
-          <p:cNvPr id="40" name="Suorakulmio 39">
-            <a:extLst>
-              <a:ext uri="{FF2B5EF4-FFF2-40B4-BE49-F238E27FC236}">
-                <a16:creationId xmlns:a16="http://schemas.microsoft.com/office/drawing/2014/main" id="{E6C464E0-11C6-F37E-F84D-113651F805E7}"/>
-              </a:ext>
-            </a:extLst>
-          </p:cNvPr>
-          <p:cNvSpPr/>
-          <p:nvPr/>
-        </p:nvSpPr>
-        <p:spPr>
-          <a:xfrm>
-            <a:off x="6790885" y="3490919"/>
-            <a:ext cx="243282" cy="155196"/>
-          </a:xfrm>
-          <a:prstGeom prst="rect">
-            <a:avLst/>
-          </a:prstGeom>
-          <a:solidFill>
-            <a:schemeClr val="bg1"/>
-          </a:solidFill>
-        </p:spPr>
-        <p:style>
-          <a:lnRef idx="2">
-            <a:schemeClr val="accent1">
-              <a:shade val="50000"/>
-            </a:schemeClr>
-          </a:lnRef>
-          <a:fillRef idx="1">
-            <a:schemeClr val="accent1"/>
-          </a:fillRef>
-          <a:effectRef idx="0">
-            <a:schemeClr val="accent1"/>
-          </a:effectRef>
-          <a:fontRef idx="minor">
-            <a:schemeClr val="lt1"/>
-          </a:fontRef>
-        </p:style>
-        <p:txBody>
-          <a:bodyPr rtlCol="0" anchor="ctr"/>
-          <a:lstStyle/>
-          <a:p>
-            <a:pPr algn="ctr"/>
-            <a:endParaRPr lang="en-GB"/>
-          </a:p>
-        </p:txBody>
-      </p:sp>
-      <p:sp>
-        <p:nvSpPr>
-          <p:cNvPr id="44" name="Tekstiruutu 43">
-            <a:extLst>
-              <a:ext uri="{FF2B5EF4-FFF2-40B4-BE49-F238E27FC236}">
-                <a16:creationId xmlns:a16="http://schemas.microsoft.com/office/drawing/2014/main" id="{3EFC53C1-0864-8020-C663-76C5D2CB09C2}"/>
-              </a:ext>
-            </a:extLst>
-          </p:cNvPr>
-          <p:cNvSpPr txBox="1"/>
-          <p:nvPr/>
-        </p:nvSpPr>
-        <p:spPr>
-          <a:xfrm flipH="1">
-            <a:off x="5903542" y="1977536"/>
-            <a:ext cx="755427" cy="369332"/>
-          </a:xfrm>
-          <a:prstGeom prst="rect">
-            <a:avLst/>
-          </a:prstGeom>
-          <a:noFill/>
-        </p:spPr>
-        <p:txBody>
-          <a:bodyPr wrap="square" rtlCol="0">
-            <a:spAutoFit/>
-          </a:bodyPr>
-          <a:lstStyle/>
-          <a:p>
             <a:r>
               <a:rPr lang="fi-FI" dirty="0"/>
-              <a:t>6 kk</a:t>
-            </a:r>
-            <a:endParaRPr lang="en-GB" dirty="0"/>
-          </a:p>
-        </p:txBody>
-      </p:sp>
-      <p:sp>
-        <p:nvSpPr>
-          <p:cNvPr id="45" name="Tekstiruutu 44">
-            <a:extLst>
-              <a:ext uri="{FF2B5EF4-FFF2-40B4-BE49-F238E27FC236}">
-                <a16:creationId xmlns:a16="http://schemas.microsoft.com/office/drawing/2014/main" id="{EA5A396A-07F8-BCF4-DE6E-A4236F5C2C1A}"/>
-              </a:ext>
-            </a:extLst>
-          </p:cNvPr>
-          <p:cNvSpPr txBox="1"/>
-          <p:nvPr/>
-        </p:nvSpPr>
-        <p:spPr>
-          <a:xfrm flipH="1">
-            <a:off x="5903541" y="2427754"/>
-            <a:ext cx="755427" cy="369332"/>
-          </a:xfrm>
-          <a:prstGeom prst="rect">
-            <a:avLst/>
-          </a:prstGeom>
-          <a:noFill/>
-        </p:spPr>
-        <p:txBody>
-          <a:bodyPr wrap="square" rtlCol="0">
-            <a:spAutoFit/>
-          </a:bodyPr>
-          <a:lstStyle/>
-          <a:p>
-            <a:r>
-              <a:rPr lang="fi-FI" dirty="0"/>
-              <a:t>12 kk</a:t>
-            </a:r>
-            <a:endParaRPr lang="en-GB" dirty="0"/>
-          </a:p>
-        </p:txBody>
-      </p:sp>
-      <p:sp>
-        <p:nvSpPr>
-          <p:cNvPr id="46" name="Tekstiruutu 45">
-            <a:extLst>
-              <a:ext uri="{FF2B5EF4-FFF2-40B4-BE49-F238E27FC236}">
-                <a16:creationId xmlns:a16="http://schemas.microsoft.com/office/drawing/2014/main" id="{BA96FC3D-21EE-4D08-A39C-2DAB0B2C4353}"/>
-              </a:ext>
-            </a:extLst>
-          </p:cNvPr>
-          <p:cNvSpPr txBox="1"/>
-          <p:nvPr/>
-        </p:nvSpPr>
-        <p:spPr>
-          <a:xfrm flipH="1">
-            <a:off x="5903540" y="2934004"/>
-            <a:ext cx="755427" cy="369332"/>
-          </a:xfrm>
-          <a:prstGeom prst="rect">
-            <a:avLst/>
-          </a:prstGeom>
-          <a:noFill/>
-        </p:spPr>
-        <p:txBody>
-          <a:bodyPr wrap="square" rtlCol="0">
-            <a:spAutoFit/>
-          </a:bodyPr>
-          <a:lstStyle/>
-          <a:p>
-            <a:r>
-              <a:rPr lang="fi-FI" dirty="0"/>
-              <a:t>30 pv</a:t>
-            </a:r>
-            <a:endParaRPr lang="en-GB" dirty="0"/>
-          </a:p>
-        </p:txBody>
-      </p:sp>
-      <p:sp>
-        <p:nvSpPr>
-          <p:cNvPr id="47" name="Tekstiruutu 46">
-            <a:extLst>
-              <a:ext uri="{FF2B5EF4-FFF2-40B4-BE49-F238E27FC236}">
-                <a16:creationId xmlns:a16="http://schemas.microsoft.com/office/drawing/2014/main" id="{E4B2032D-DF9C-1C83-0D28-13AF7D43FDBA}"/>
-              </a:ext>
-            </a:extLst>
-          </p:cNvPr>
-          <p:cNvSpPr txBox="1"/>
-          <p:nvPr/>
-        </p:nvSpPr>
-        <p:spPr>
-          <a:xfrm flipH="1">
-            <a:off x="5872293" y="3383851"/>
-            <a:ext cx="755427" cy="369332"/>
-          </a:xfrm>
-          <a:prstGeom prst="rect">
-            <a:avLst/>
-          </a:prstGeom>
-          <a:noFill/>
-        </p:spPr>
-        <p:txBody>
-          <a:bodyPr wrap="square" rtlCol="0">
-            <a:spAutoFit/>
-          </a:bodyPr>
-          <a:lstStyle/>
-          <a:p>
-            <a:r>
-              <a:rPr lang="fi-FI" dirty="0"/>
-              <a:t>1 kk</a:t>
-            </a:r>
-            <a:endParaRPr lang="en-GB" dirty="0"/>
-          </a:p>
-        </p:txBody>
-      </p:sp>
-      <p:sp>
-        <p:nvSpPr>
-          <p:cNvPr id="49" name="Suorakulmio 48">
-            <a:extLst>
-              <a:ext uri="{FF2B5EF4-FFF2-40B4-BE49-F238E27FC236}">
-                <a16:creationId xmlns:a16="http://schemas.microsoft.com/office/drawing/2014/main" id="{B92E8731-1C15-A94E-5E8A-0638CD72ECEA}"/>
-              </a:ext>
-            </a:extLst>
-          </p:cNvPr>
-          <p:cNvSpPr/>
-          <p:nvPr/>
-        </p:nvSpPr>
-        <p:spPr>
-          <a:xfrm>
-            <a:off x="8955666" y="2037718"/>
-            <a:ext cx="1384184" cy="310392"/>
-          </a:xfrm>
-          <a:prstGeom prst="rect">
-            <a:avLst/>
-          </a:prstGeom>
-          <a:noFill/>
-        </p:spPr>
-        <p:style>
-          <a:lnRef idx="2">
-            <a:schemeClr val="accent1">
-              <a:shade val="50000"/>
-            </a:schemeClr>
-          </a:lnRef>
-          <a:fillRef idx="1">
-            <a:schemeClr val="accent1"/>
-          </a:fillRef>
-          <a:effectRef idx="0">
-            <a:schemeClr val="accent1"/>
-          </a:effectRef>
-          <a:fontRef idx="minor">
-            <a:schemeClr val="lt1"/>
-          </a:fontRef>
-        </p:style>
-        <p:txBody>
-          <a:bodyPr rtlCol="0" anchor="ctr"/>
-          <a:lstStyle/>
-          <a:p>
-            <a:pPr algn="ctr"/>
-            <a:endParaRPr lang="en-GB"/>
-          </a:p>
-        </p:txBody>
-      </p:sp>
-      <p:sp>
-        <p:nvSpPr>
-          <p:cNvPr id="50" name="Suorakulmio 49">
-            <a:extLst>
-              <a:ext uri="{FF2B5EF4-FFF2-40B4-BE49-F238E27FC236}">
-                <a16:creationId xmlns:a16="http://schemas.microsoft.com/office/drawing/2014/main" id="{36320FBE-A2DA-76F0-5CB1-ABA58BF3FE2E}"/>
-              </a:ext>
-            </a:extLst>
-          </p:cNvPr>
-          <p:cNvSpPr/>
-          <p:nvPr/>
-        </p:nvSpPr>
-        <p:spPr>
-          <a:xfrm>
-            <a:off x="9974925" y="2112304"/>
-            <a:ext cx="243282" cy="155196"/>
-          </a:xfrm>
-          <a:prstGeom prst="rect">
-            <a:avLst/>
-          </a:prstGeom>
-          <a:solidFill>
-            <a:schemeClr val="bg1"/>
-          </a:solidFill>
-        </p:spPr>
-        <p:style>
-          <a:lnRef idx="2">
-            <a:schemeClr val="accent1">
-              <a:shade val="50000"/>
-            </a:schemeClr>
-          </a:lnRef>
-          <a:fillRef idx="1">
-            <a:schemeClr val="accent1"/>
-          </a:fillRef>
-          <a:effectRef idx="0">
-            <a:schemeClr val="accent1"/>
-          </a:effectRef>
-          <a:fontRef idx="minor">
-            <a:schemeClr val="lt1"/>
-          </a:fontRef>
-        </p:style>
-        <p:txBody>
-          <a:bodyPr rtlCol="0" anchor="ctr"/>
-          <a:lstStyle/>
-          <a:p>
-            <a:pPr algn="ctr"/>
-            <a:endParaRPr lang="en-GB"/>
-          </a:p>
-        </p:txBody>
-      </p:sp>
-      <p:sp>
-        <p:nvSpPr>
-          <p:cNvPr id="51" name="Suorakulmio 50">
-            <a:extLst>
-              <a:ext uri="{FF2B5EF4-FFF2-40B4-BE49-F238E27FC236}">
-                <a16:creationId xmlns:a16="http://schemas.microsoft.com/office/drawing/2014/main" id="{0CE097F8-9A51-67AF-885E-31053B3A0BFA}"/>
-              </a:ext>
-            </a:extLst>
-          </p:cNvPr>
-          <p:cNvSpPr/>
-          <p:nvPr/>
-        </p:nvSpPr>
-        <p:spPr>
-          <a:xfrm>
-            <a:off x="8955666" y="2527871"/>
-            <a:ext cx="1384184" cy="310392"/>
-          </a:xfrm>
-          <a:prstGeom prst="rect">
-            <a:avLst/>
-          </a:prstGeom>
-          <a:noFill/>
-        </p:spPr>
-        <p:style>
-          <a:lnRef idx="2">
-            <a:schemeClr val="accent1">
-              <a:shade val="50000"/>
-            </a:schemeClr>
-          </a:lnRef>
-          <a:fillRef idx="1">
-            <a:schemeClr val="accent1"/>
-          </a:fillRef>
-          <a:effectRef idx="0">
-            <a:schemeClr val="accent1"/>
-          </a:effectRef>
-          <a:fontRef idx="minor">
-            <a:schemeClr val="lt1"/>
-          </a:fontRef>
-        </p:style>
-        <p:txBody>
-          <a:bodyPr rtlCol="0" anchor="ctr"/>
-          <a:lstStyle/>
-          <a:p>
-            <a:pPr algn="ctr"/>
-            <a:endParaRPr lang="en-GB"/>
-          </a:p>
-        </p:txBody>
-      </p:sp>
-      <p:sp>
-        <p:nvSpPr>
-          <p:cNvPr id="52" name="Suorakulmio 51">
-            <a:extLst>
-              <a:ext uri="{FF2B5EF4-FFF2-40B4-BE49-F238E27FC236}">
-                <a16:creationId xmlns:a16="http://schemas.microsoft.com/office/drawing/2014/main" id="{40244ACA-5145-24AB-1596-41F5FC24EEE9}"/>
-              </a:ext>
-            </a:extLst>
-          </p:cNvPr>
-          <p:cNvSpPr/>
-          <p:nvPr/>
-        </p:nvSpPr>
-        <p:spPr>
-          <a:xfrm>
-            <a:off x="9974925" y="2602457"/>
-            <a:ext cx="243282" cy="155196"/>
-          </a:xfrm>
-          <a:prstGeom prst="rect">
-            <a:avLst/>
-          </a:prstGeom>
-          <a:solidFill>
-            <a:schemeClr val="bg1"/>
-          </a:solidFill>
-        </p:spPr>
-        <p:style>
-          <a:lnRef idx="2">
-            <a:schemeClr val="accent1">
-              <a:shade val="50000"/>
-            </a:schemeClr>
-          </a:lnRef>
-          <a:fillRef idx="1">
-            <a:schemeClr val="accent1"/>
-          </a:fillRef>
-          <a:effectRef idx="0">
-            <a:schemeClr val="accent1"/>
-          </a:effectRef>
-          <a:fontRef idx="minor">
-            <a:schemeClr val="lt1"/>
-          </a:fontRef>
-        </p:style>
-        <p:txBody>
-          <a:bodyPr rtlCol="0" anchor="ctr"/>
-          <a:lstStyle/>
-          <a:p>
-            <a:pPr algn="ctr"/>
-            <a:endParaRPr lang="en-GB"/>
-          </a:p>
-        </p:txBody>
-      </p:sp>
-      <p:sp>
-        <p:nvSpPr>
-          <p:cNvPr id="53" name="Suorakulmio 52">
-            <a:extLst>
-              <a:ext uri="{FF2B5EF4-FFF2-40B4-BE49-F238E27FC236}">
-                <a16:creationId xmlns:a16="http://schemas.microsoft.com/office/drawing/2014/main" id="{DEAB5DCE-3CA3-C274-F768-DBC9B0A11655}"/>
-              </a:ext>
-            </a:extLst>
-          </p:cNvPr>
-          <p:cNvSpPr/>
-          <p:nvPr/>
-        </p:nvSpPr>
-        <p:spPr>
-          <a:xfrm>
-            <a:off x="8955666" y="3002895"/>
-            <a:ext cx="1384184" cy="310392"/>
-          </a:xfrm>
-          <a:prstGeom prst="rect">
-            <a:avLst/>
-          </a:prstGeom>
-          <a:noFill/>
-        </p:spPr>
-        <p:style>
-          <a:lnRef idx="2">
-            <a:schemeClr val="accent1">
-              <a:shade val="50000"/>
-            </a:schemeClr>
-          </a:lnRef>
-          <a:fillRef idx="1">
-            <a:schemeClr val="accent1"/>
-          </a:fillRef>
-          <a:effectRef idx="0">
-            <a:schemeClr val="accent1"/>
-          </a:effectRef>
-          <a:fontRef idx="minor">
-            <a:schemeClr val="lt1"/>
-          </a:fontRef>
-        </p:style>
-        <p:txBody>
-          <a:bodyPr rtlCol="0" anchor="ctr"/>
-          <a:lstStyle/>
-          <a:p>
-            <a:pPr algn="ctr"/>
-            <a:endParaRPr lang="en-GB"/>
-          </a:p>
-        </p:txBody>
-      </p:sp>
-      <p:sp>
-        <p:nvSpPr>
-          <p:cNvPr id="54" name="Suorakulmio 53">
-            <a:extLst>
-              <a:ext uri="{FF2B5EF4-FFF2-40B4-BE49-F238E27FC236}">
-                <a16:creationId xmlns:a16="http://schemas.microsoft.com/office/drawing/2014/main" id="{C5219E35-BBF4-DD87-1B9B-4D4A1307BE34}"/>
-              </a:ext>
-            </a:extLst>
-          </p:cNvPr>
-          <p:cNvSpPr/>
-          <p:nvPr/>
-        </p:nvSpPr>
-        <p:spPr>
-          <a:xfrm>
-            <a:off x="9974925" y="3077481"/>
-            <a:ext cx="243282" cy="155196"/>
-          </a:xfrm>
-          <a:prstGeom prst="rect">
-            <a:avLst/>
-          </a:prstGeom>
-          <a:solidFill>
-            <a:schemeClr val="bg1"/>
-          </a:solidFill>
-        </p:spPr>
-        <p:style>
-          <a:lnRef idx="2">
-            <a:schemeClr val="accent1">
-              <a:shade val="50000"/>
-            </a:schemeClr>
-          </a:lnRef>
-          <a:fillRef idx="1">
-            <a:schemeClr val="accent1"/>
-          </a:fillRef>
-          <a:effectRef idx="0">
-            <a:schemeClr val="accent1"/>
-          </a:effectRef>
-          <a:fontRef idx="minor">
-            <a:schemeClr val="lt1"/>
-          </a:fontRef>
-        </p:style>
-        <p:txBody>
-          <a:bodyPr rtlCol="0" anchor="ctr"/>
-          <a:lstStyle/>
-          <a:p>
-            <a:pPr algn="ctr"/>
-            <a:endParaRPr lang="en-GB"/>
-          </a:p>
-        </p:txBody>
-      </p:sp>
-      <p:sp>
-        <p:nvSpPr>
-          <p:cNvPr id="57" name="Tekstiruutu 56">
-            <a:extLst>
-              <a:ext uri="{FF2B5EF4-FFF2-40B4-BE49-F238E27FC236}">
-                <a16:creationId xmlns:a16="http://schemas.microsoft.com/office/drawing/2014/main" id="{DF13B4B3-D62B-D1B5-BAC8-222338352EF7}"/>
-              </a:ext>
-            </a:extLst>
-          </p:cNvPr>
-          <p:cNvSpPr txBox="1"/>
-          <p:nvPr/>
-        </p:nvSpPr>
-        <p:spPr>
-          <a:xfrm flipH="1">
-            <a:off x="9087582" y="2020167"/>
-            <a:ext cx="755427" cy="369332"/>
-          </a:xfrm>
-          <a:prstGeom prst="rect">
-            <a:avLst/>
-          </a:prstGeom>
-          <a:noFill/>
-        </p:spPr>
-        <p:txBody>
-          <a:bodyPr wrap="square" rtlCol="0">
-            <a:spAutoFit/>
-          </a:bodyPr>
-          <a:lstStyle/>
-          <a:p>
-            <a:r>
-              <a:rPr lang="fi-FI" dirty="0"/>
-              <a:t>Basic</a:t>
-            </a:r>
-            <a:endParaRPr lang="en-GB" dirty="0"/>
-          </a:p>
-        </p:txBody>
-      </p:sp>
-      <p:sp>
-        <p:nvSpPr>
-          <p:cNvPr id="58" name="Tekstiruutu 57">
-            <a:extLst>
-              <a:ext uri="{FF2B5EF4-FFF2-40B4-BE49-F238E27FC236}">
-                <a16:creationId xmlns:a16="http://schemas.microsoft.com/office/drawing/2014/main" id="{A4FCE25E-4DEE-5EF1-1728-E0565B45CD4D}"/>
-              </a:ext>
-            </a:extLst>
-          </p:cNvPr>
-          <p:cNvSpPr txBox="1"/>
-          <p:nvPr/>
-        </p:nvSpPr>
-        <p:spPr>
-          <a:xfrm flipH="1">
-            <a:off x="9087581" y="2470385"/>
-            <a:ext cx="755427" cy="369332"/>
-          </a:xfrm>
-          <a:prstGeom prst="rect">
-            <a:avLst/>
-          </a:prstGeom>
-          <a:noFill/>
-        </p:spPr>
-        <p:txBody>
-          <a:bodyPr wrap="square" rtlCol="0">
-            <a:spAutoFit/>
-          </a:bodyPr>
-          <a:lstStyle/>
-          <a:p>
-            <a:r>
-              <a:rPr lang="fi-FI" dirty="0"/>
-              <a:t>Pro</a:t>
-            </a:r>
-            <a:endParaRPr lang="en-GB" dirty="0"/>
-          </a:p>
-        </p:txBody>
-      </p:sp>
-      <p:sp>
-        <p:nvSpPr>
-          <p:cNvPr id="59" name="Tekstiruutu 58">
-            <a:extLst>
-              <a:ext uri="{FF2B5EF4-FFF2-40B4-BE49-F238E27FC236}">
-                <a16:creationId xmlns:a16="http://schemas.microsoft.com/office/drawing/2014/main" id="{B3BE3515-08E0-20E6-1AF9-5794FCDE918C}"/>
-              </a:ext>
-            </a:extLst>
-          </p:cNvPr>
-          <p:cNvSpPr txBox="1"/>
-          <p:nvPr/>
-        </p:nvSpPr>
-        <p:spPr>
-          <a:xfrm flipH="1">
-            <a:off x="8924418" y="2976635"/>
-            <a:ext cx="1293787" cy="369332"/>
-          </a:xfrm>
-          <a:prstGeom prst="rect">
-            <a:avLst/>
-          </a:prstGeom>
-          <a:noFill/>
-        </p:spPr>
-        <p:txBody>
-          <a:bodyPr wrap="square" rtlCol="0">
-            <a:spAutoFit/>
-          </a:bodyPr>
-          <a:lstStyle/>
-          <a:p>
-            <a:r>
-              <a:rPr lang="fi-FI" dirty="0"/>
-              <a:t>Enterprise</a:t>
+              <a:t>Peruuta</a:t>
             </a:r>
             <a:endParaRPr lang="en-GB" dirty="0"/>
           </a:p>
@@ -5622,7 +5598,7 @@
     </p:spTree>
     <p:extLst>
       <p:ext uri="{BB962C8B-B14F-4D97-AF65-F5344CB8AC3E}">
-        <p14:creationId xmlns:p14="http://schemas.microsoft.com/office/powerpoint/2010/main" val="3464337047"/>
+        <p14:creationId xmlns:p14="http://schemas.microsoft.com/office/powerpoint/2010/main" val="1151625996"/>
       </p:ext>
     </p:extLst>
   </p:cSld>

</xml_diff>